<commit_message>
update monday slides - conditionals with examples
</commit_message>
<xml_diff>
--- a/slides/On-Campus/06_01_LogicalOperators.pptx
+++ b/slides/On-Campus/06_01_LogicalOperators.pptx
@@ -5,16 +5,21 @@
     <p:sldMasterId id="2147483648" r:id="rId1"/>
   </p:sldMasterIdLst>
   <p:notesMasterIdLst>
-    <p:notesMasterId r:id="rId6"/>
+    <p:notesMasterId r:id="rId11"/>
   </p:notesMasterIdLst>
   <p:handoutMasterIdLst>
-    <p:handoutMasterId r:id="rId7"/>
+    <p:handoutMasterId r:id="rId12"/>
   </p:handoutMasterIdLst>
   <p:sldIdLst>
     <p:sldId id="256" r:id="rId2"/>
-    <p:sldId id="257" r:id="rId3"/>
-    <p:sldId id="258" r:id="rId4"/>
-    <p:sldId id="259" r:id="rId5"/>
+    <p:sldId id="266" r:id="rId3"/>
+    <p:sldId id="260" r:id="rId4"/>
+    <p:sldId id="257" r:id="rId5"/>
+    <p:sldId id="268" r:id="rId6"/>
+    <p:sldId id="258" r:id="rId7"/>
+    <p:sldId id="267" r:id="rId8"/>
+    <p:sldId id="259" r:id="rId9"/>
+    <p:sldId id="262" r:id="rId10"/>
   </p:sldIdLst>
   <p:sldSz cx="13817600" cy="7772400"/>
   <p:notesSz cx="6858000" cy="9144000"/>
@@ -217,7 +222,7 @@
           <a:p>
             <a:fld id="{4D7E51A5-B478-1E40-8CBB-0DAA8831E99D}" type="datetimeFigureOut">
               <a:rPr lang="en-US" smtClean="0"/>
-              <a:t>4/11/20</a:t>
+              <a:t>9/26/2021</a:t>
             </a:fld>
             <a:endParaRPr lang="en-US"/>
           </a:p>
@@ -298,6 +303,66 @@
   </p:cSld>
   <p:clrMap bg1="lt1" tx1="dk1" bg2="lt2" tx2="dk2" accent1="accent1" accent2="accent2" accent3="accent3" accent4="accent4" accent5="accent5" accent6="accent6" hlink="hlink" folHlink="folHlink"/>
 </p:handoutMaster>
+</file>
+
+<file path=ppt/ink/ink1.xml><?xml version="1.0" encoding="utf-8"?>
+<inkml:ink xmlns:inkml="http://www.w3.org/2003/InkML">
+  <inkml:definitions>
+    <inkml:context xml:id="ctx0">
+      <inkml:inkSource xml:id="inkSrc0">
+        <inkml:traceFormat>
+          <inkml:channel name="X" type="integer" min="-2.14748E9" max="2.14748E9" units="cm"/>
+          <inkml:channel name="Y" type="integer" min="-2.14748E9" max="2.14748E9" units="cm"/>
+          <inkml:channel name="F" type="integer" max="32767" units="dev"/>
+        </inkml:traceFormat>
+        <inkml:channelProperties>
+          <inkml:channelProperty channel="X" name="resolution" value="1000" units="1/cm"/>
+          <inkml:channelProperty channel="Y" name="resolution" value="1000" units="1/cm"/>
+          <inkml:channelProperty channel="F" name="resolution" value="0" units="1/dev"/>
+        </inkml:channelProperties>
+      </inkml:inkSource>
+      <inkml:timestamp xml:id="ts0" timeString="2021-09-27T03:58:07.890"/>
+    </inkml:context>
+    <inkml:brush xml:id="br0">
+      <inkml:brushProperty name="width" value="0.3" units="cm"/>
+      <inkml:brushProperty name="height" value="0.6" units="cm"/>
+      <inkml:brushProperty name="color" value="#FFFC00"/>
+      <inkml:brushProperty name="tip" value="rectangle"/>
+      <inkml:brushProperty name="rasterOp" value="maskPen"/>
+    </inkml:brush>
+  </inkml:definitions>
+  <inkml:trace contextRef="#ctx0" brushRef="#br0">0 230 520,'13'0'6580,"39"-1"-6220,30-22 14,-27 6-318,-45 13 16,-1 1 1,0 0 0,0 1 0,1-1 0,0 2-1,11-2 1,-13 3 5,1-1 0,-1 0-1,0 0 1,0-1 0,0 0 0,9-4-1,39 0 38,-24-2-79,-21 4-13,-1 1 0,1 1 0,0 0 0,15-1 0,3-4-47,-10 5 854,-19 3-810,1 0 0,-1 0 0,0 1-1,1-1 1,-1 0 0,0 1 0,0-1-1,0 0 1,0 1 0,0-1 0,0 0-1,0 1 1,0-1 0,-1 0 0,1 1-1,0-1 1,-1 0 0,1 1-1,-2 0 1,1 3-15,-1 0 0,0 0 0,0 0 0,0-1 0,-1 1 0,0-1 0,0 0 0,0 0 0,-5 5 0,8-8 11,-4 5 5,1 1 1,0-1 0,-1 0 0,0-1-1,-10 11 1,10-12 32,-1-1-1,1 0 0,-1 0 0,0 0 0,0-1 1,0 0-1,0 0 0,-6 2 0,-15 6 202,7 5-117,18-14-109,0 1 1,-1-1 0,1 0-1,0 1 1,0-1 0,-1 0-1,1 0 1,-1 0 0,1 0-1,-1 0 1,1 0 0,-1-1-1,0 1 1,1 0 0,-1-1-1,0 1 1,0-1 0,1 0-1,-1 0 1,0 0 0,0 1-1,-1-2 1,-100 11 723,-18 3-511,121-13-205,-1-1-98,1-1 58,0 0 0,0 0 1,0 1-1,-1-1 0,1 0 1,-1 1-1,1-1 0,-1 0 1,0 1-1,1-1 0,-1 1 1,0-1-1,0 1 0,0 0 1,0-1-1,-1 1 0,1 0 1,0 0-1,0 0 0,-1-1 1,1 1-1,-1 1 0,1-1 1,-3-1-1,3 1-4,0 0 0,1 0 0,-1 1 0,0-1 0,1 0 0,-1 0-1,1 0 1,-1 0 0,1 0 0,0 0 0,-1 0 0,1 0 0,0-1 0,0 1 0,-1 0 0,1 0 0,0 0-1,0 0 1,0 0 0,1-1 0,-1-33-162,1 23 92,-2-22-267,0 16 169,1 1 1,0-1-1,5-28 0,-5 42 143,1 0 0,0 0 0,0 0-1,1 0 1,-1 0 0,1 0 0,0 1 0,0-1 0,0 1-1,0-1 1,1 1 0,0 0 0,-1 0 0,1 0-1,0 0 1,0 0 0,1 1 0,-1-1 0,0 1 0,7-3-1,8-5-251,-15 8 272,0 1 0,1-1 0,-1 0 0,0 1 1,1 0-1,-1 0 0,1 0 0,0 0 0,-1 1 0,1-1 0,6 1 1,101 0-184,-110 0 182,9 4-223,-8-3 234,0 0 1,-1-1 0,0 1-1,1 0 1,-1 0 0,1 0-1,-1 0 1,0 0 0,0 0-1,1 1 1,-1-1 0,0 0-1,0 1 1,1 1-1,2 2 7,0 1-1,0 0 0,0 0 0,-1 0 1,0 0-1,0 1 0,0-1 0,-1 1 1,0 0-1,1 9 0,-3-15 50,5 30-28,0 0 27,-2 0 0,-1 0 0,-1 34 0,-1-44-26,-1-20 0,1 0-1,-1 1 1,1-1 0,-1 1 0,1-1-1,-1 0 1,0 0 0,0 1-1,0-1 1,0 0 0,0 0 0,0 0-1,0 0 1,0 0 0,0 0 0,0 0-1,0 0 1,-1-1 0,1 1 0,0 0-1,-1-1 1,1 1 0,-1-1-1,1 1 1,0-1 0,-1 0 0,1 0-1,-1 0 1,1 1 0,-1-1 0,1-1-1,-2 1 1,-67 0 15,45-2-5,-116 11 98,140-9-116,-9-45 35,9 41-49,1-1-1,-1 0 1,0 1-1,0-1 0,-1 1 1,1-1-1,-1 1 1,-4-9-1,3 9-12,1-1 0,0 1 0,0-1 0,0 0 0,1 1-1,0-1 1,0 0 0,0 0 0,0-5 0,1-68-939,3 75 930,1 0-1,-1 1 0,1-1 0,-1 1 1,1 0-1,0 0 0,0 0 0,5-1 1,9-6 11,-3-1-24,0 2 0,0 0 0,1 1 0,24-8 1</inkml:trace>
+</inkml:ink>
+</file>
+
+<file path=ppt/ink/ink2.xml><?xml version="1.0" encoding="utf-8"?>
+<inkml:ink xmlns:inkml="http://www.w3.org/2003/InkML">
+  <inkml:definitions>
+    <inkml:context xml:id="ctx0">
+      <inkml:inkSource xml:id="inkSrc0">
+        <inkml:traceFormat>
+          <inkml:channel name="X" type="integer" min="-2.14748E9" max="2.14748E9" units="cm"/>
+          <inkml:channel name="Y" type="integer" min="-2.14748E9" max="2.14748E9" units="cm"/>
+          <inkml:channel name="F" type="integer" max="32767" units="dev"/>
+        </inkml:traceFormat>
+        <inkml:channelProperties>
+          <inkml:channelProperty channel="X" name="resolution" value="1000" units="1/cm"/>
+          <inkml:channelProperty channel="Y" name="resolution" value="1000" units="1/cm"/>
+          <inkml:channelProperty channel="F" name="resolution" value="0" units="1/dev"/>
+        </inkml:channelProperties>
+      </inkml:inkSource>
+      <inkml:timestamp xml:id="ts0" timeString="2021-09-27T03:58:19.401"/>
+    </inkml:context>
+    <inkml:brush xml:id="br0">
+      <inkml:brushProperty name="width" value="0.3" units="cm"/>
+      <inkml:brushProperty name="height" value="0.6" units="cm"/>
+      <inkml:brushProperty name="color" value="#FFFC00"/>
+      <inkml:brushProperty name="tip" value="rectangle"/>
+      <inkml:brushProperty name="rasterOp" value="maskPen"/>
+    </inkml:brush>
+  </inkml:definitions>
+  <inkml:trace contextRef="#ctx0" brushRef="#br0">271 529 128,'-25'-9'5186,"-6"9"-1442,25 0-3663,-1 1 0,1-1 0,0-1 0,-1 0 0,1 0 0,-1 0 0,1 0 0,0-1-1,-12-5 1,17 6 23,-4-254-722,5 254 588,31 1-789,95 0 446,-123 2 375,0 0-1,0 0 1,0 0 0,0 1-1,0 0 1,0-1-1,-1 1 1,1 0 0,-1 0-1,0 1 1,0-1 0,2 4-1,11 14 15,-12-18-21,0 1-1,0 0 0,-1-1 0,1 1 1,-1 0-1,0 1 0,0-1 0,0 0 1,0 0-1,-1 1 0,0-1 1,0 1-1,1 8 0,1 66-264,-4-56 228,1-21 35,0 1 0,0-1-1,0 1 1,-1-1-1,1 0 1,-1 1 0,0-1-1,0 0 1,1 1-1,-2-1 1,1 0-1,0 0 1,0 0 0,-1 0-1,1 0 1,-1 0-1,1 0 1,-1-1 0,0 1-1,0-1 1,1 1-1,-1-1 1,-1 1 0,1-1-1,0 0 1,0 0-1,0 0 1,0 0 0,-1-1-1,1 1 1,-4 0-1,-8 2 7,-1-2-1,1 1 0,0-2 1,-20-1-1,10 0-57,20 1 64,0-1 0,-1 0 0,1-1 0,0 1 0,0-1 0,0 0 0,0 0 0,0 0 0,0 0 0,0-1 0,1 0 0,-1 0 0,1 0 0,0 0 0,0 0 0,0 0 0,0-1 0,1 0 0,-1 1 0,1-1 0,0 0 0,0 0 0,-1-5 0,-6-8-63,7 14 54,1 0 0,-1 0 0,1 0 0,0 0-1,0 0 1,0-1 0,0 1 0,0 0 0,1 0 0,0-1-1,-1-5 1,-4-278-1299,6 283 1292,0-1-1,0 1 1,0-1-1,0 1 1,0 0-1,1 0 0,0 0 1,0 0-1,0 0 1,1 0-1,-1 0 1,1 1-1,0-1 1,0 1-1,6-6 0,-3 3-85,1 1 0,0-1-1,0 1 1,0 1-1,1-1 1,14-6-1,-9 8-2,-1 1-1,0-1 1,1 2-1,-1 0 1,1 0-1,17 3 1,-1-2 53,-28 0 50,1 0 0,-1 1 1,0-1-1,1 0 1,-1 1-1,1-1 0,-1 1 1,0-1-1,1 1 0,-1-1 1,0 1-1,1 0 1,-1 0-1,0 0 0,0 0 1,0 0-1,0 0 0,0 0 1,0 0-1,0 0 1,1 3-1,13 37 85,-12-21-44,0 1-1,-1 27 1,-2-17-11,1-20-45,0 0 0,-1 0 0,0 0 0,-1 0 0,0 0 0,-1 0 0,0 0 0,0 0 0,-1-1 0,-1 1 0,0-1 0,0 0 0,-7 10 0,7-13-1,-1-1-1,0 0 0,0 0 1,0 0-1,-1 0 0,1-1 0,-10 6 1,12-9 21,0-1 0,1 1 0,-1-1 0,0 0 1,0 0-1,0 0 0,0-1 0,0 1 0,-1-1 1,1 1-1,0-1 0,0 0 0,0 0 0,0-1 1,0 1-1,-1-1 0,1 1 0,0-1 0,0 0 1,0 0-1,-4-3 0,-1 0 1,-1 1 0,1-1 0,-1 1-1,0 1 1,0 0 0,0 0 0,0 1 0,0 0 0,0 0 0,-11 1-1,18 0 2,-1-1 1,1 0-1,0 0 0,0 1 0,0-2 0,-1 1 0,1 0 0,0 0 0,1-1 0,-1 1 1,0-1-1,0 1 0,0-1 0,1 0 0,-3-3 0,-22-18 715,24 20-716,0 1 0,1-1-1,-1 0 1,1 0-1,0 0 1,-1 0 0,1 0-1,1 0 1,-1 0 0,0 0-1,1 0 1,0 0-1,0 0 1,-1 0 0,2-4-1,-3-16 56,-1 6-106,1-1 0,1 0 1,2-24-1,-1 10-490,1 30 507,0 1 1,0-1-1,0 1 1,0-1-1,0 1 1,0-1-1,0 1 1,0 0-1,1-1 1,-1 1-1,0 0 0,1 0 1,-1 0-1,1 0 1,-1 0-1,1 1 1,0-1-1,-1 0 1,1 1-1,0-1 1,0 1-1,1-1 1,52-13-46,-46 12 65,12-1 19,-1 0 0,1 1 0,23 0 0,-41 3-8,-1 0 1,0-1-1,0 1 1,1 0-1,-1 0 0,0 0 1,0 1-1,0-1 1,0 0-1,0 1 0,0-1 1,0 1-1,-1 0 0,1-1 1,-1 1-1,1 0 1,-1 0-1,2 3 0,21 39 34,-20-29-20,0 0-1,-1 0 0,-1 1 0,0-1 1,-1 1-1,-1-1 0,-1 1 0,-2 16 0,1 19-18,3-29-52,0-17 46,0 0 0,-1-1 0,1 1 0,-1 0 0,0-1 1,-1 1-1,1 0 0,-1 0 0,0-1 0,0 1 0,0-1 0,-1 1 0,0-1 1,-2 6-1,3-10 74,-45-1 1257,44-1-1326,1 1 0,-1 0 0,0-1 1,1 1-1,-1-1 0,1 0 0,-1 0 1,1 1-1,0-1 0,0 0 1,0 0-1,0 0 0,-1-4 0,1 3 2,0 0-1,-1 1 0,1-1 1,-1 1-1,1-1 1,-1 1-1,0-1 0,0 1 1,0 0-1,-2-3 0,-5-1-8,1-1 0,1 0 0,-1-1 0,1 0 0,1 0 0,0-1 0,0 0 0,0 0 0,1 0 0,0 0 0,-6-20 0,3 10-22,-1 2 12,8 14 16,-1 0 0,1 0 0,-1 0-1,1 0 1,0 0 0,0 0-1,0 0 1,1 0 0,-1 0 0,1-1-1,0-5 1,-2-18-33,3-25-135,0 49 163,-1 0 0,1 1 0,0-1 0,0 1 0,0 0 0,0-1 0,0 1 0,0 0 0,0-1 0,1 1 0,0 0 0,-1 0 0,1 0 0,0 0 0,0 1 0,0-1 0,2-1 0,11-9-90,-12 10 56,-1 0 0,1 0 0,-1 1 0,1-1-1,0 0 1,-1 1 0,1 0 0,0-1 0,0 1 0,0 0 0,0 0 0,0 1 0,0-1 0,0 1 0,6-1 0,-5 1 36,-1 0 0,1 0 0,-1 0 1,1 0-1,-1 1 0,0-1 0,1 1 0,-1 0 1,0 0-1,1 0 0,-1 1 0,0-1 0,0 1 0,0-1 1,0 1-1,3 3 0,-4-3-7,0 2 0,0-1 0,0 0 1,0 0-1,-1 0 0,1 1 0,-1-1 0,0 1 0,0-1 0,0 1 0,-1 0 1,1-1-1,-1 1 0,0 0 0,0 6 0,1 42 45,0-35-35,0 1 1,0-1-1,-2 1 0,0 0 0,-1-1 0,-1 1 1,-1-1-1,0 0 0,-1 0 0,-10 22 0,10-29-12,4-8 34,0 1 0,0-1 1,0 0-1,0 0 0,0 0 1,0 0-1,0 0 0,-1 0 0,1 0 1,-1 0-1,0 0 0,1-1 1,-1 1-1,0-1 0,0 1 1,0-1-1,0 1 0,0-1 1,0 0-1,-1 0 0,1 0 0,0-1 1,0 1-1,-1 0 0,1-1 1,0 0-1,-1 1 0,1-1 1,-1 0-1,-3 0 0,4 0 12,-1 0-1,1 0 0,0 0 1,0 0-1,0-1 1,0 1-1,-1 0 1,1-1-1,0 0 1,0 1-1,0-1 0,0 0 1,0 0-1,0 0 1,1 0-1,-1 0 1,0-1-1,0 1 0,-2-3 1,2 0-39,-1 0 0,1-1 0,0 0 0,0 1 0,1-1 1,-1 0-1,0-5 0,-1-1-70,-2-7-7,-3-7 148,1-1 0,2 1-1,0-1 1,-1-47 0,6 71-77,0 1 1,0 0-1,0 0 0,0-1 1,0 1-1,0 0 1,0 0-1,0 0 0,0-1 1,1 1-1,-1 0 0,1 0 1,-1 0-1,1 0 0,-1 0 1,1 0-1,-1 0 1,1 0-1,0 0 0,0 0 1,-1 0-1,1 0 0,0 0 1,0 0-1,1 0 1,31-2-381,-16 3 414,-13 0-28,1 0 0,-1-1 1,1 2-1,-1-1 0,0 0 1,1 1-1,-1 0 0,0 0 1,1 0-1,-1 1 0,0-1 0,6 4 1,-8-2 12,0-1 0,0 1-1,0 0 1,0-1 0,-1 1 0,1 0 0,-1 0 0,0 0 0,0 0 0,0 0 0,0 0 0,-1 0 0,1 1 0,-1-1 0,1 0-1,-1 0 1,0 1 0,-1 4 0,1 109 97,0-115-103,0 0 1,-1 0-1,1 1 0,0-1 0,-1 0 0,1 0 1,-1 0-1,0 0 0,1 0 0,-1-1 0,0 1 1,0 0-1,-1 0 0,1 0 0,0-1 0,0 1 1,-1-1-1,1 1 0,-3 1 0,0 0-5,-1 0 0,1-1 0,0 0 0,-1 0 0,1 0 0,-1 0 0,0-1-1,-5 2 1,-11 0-51,-1 0 1,1-2-1,-23-1 0,30 0-3,1 0 36,12 1 17,0-1 0,0 0 0,0 1 0,1-1 1,-1 0-1,0 0 0,0 0 0,0 0 0,0 0 0,0 0 0,0 0 0,0 0 0,0 0 1,1 0-1,-1 0 0,0 0 0,0-1 0,0 1 0,0 0 0,0-1 0,1 1 1,-1-1-1,0 1 0,0-1 0,1 1 0,-1-1 0,0 1 0,1-1 0,-1 0 0,0 1 1,1-1-1,-1 0 0,1 1 0,-1-1 0,1 0 0,0 0 0,-1 0 0,1 0 0,0 1 1,-1-1-1,1 0 0,0 0 0,0 0 0,0 0 0,0 0 0,0 0 0,0 0 0,0 1 1,0-1-1,0-2 0,0 2-39,0 0-1,1 0 1,-1 0 0,0-1 0,0 1-1,0 0 1,1 0 0,-1 0 0,0 0 0,1 0-1,-1 0 1,1 0 0,-1 0 0,1 0-1,0 0 1,0 0 0,-1 0 0,1 0 0,0 0-1,0 1 1,0-1 0,0 0 0,0 0-1,0 1 1,0-1 0,0 1 0,0-1 0,0 1-1,0-1 1,2 1 0,21-13-1657</inkml:trace>
+</inkml:ink>
 </file>
 
 <file path=ppt/notesMasters/notesMaster1.xml><?xml version="1.0" encoding="utf-8"?>
@@ -382,7 +447,7 @@
           <a:p>
             <a:fld id="{D0ED587F-861E-6740-9643-E3DDAE89B8D6}" type="datetimeFigureOut">
               <a:rPr lang="en-US" smtClean="0"/>
-              <a:t>4/11/20</a:t>
+              <a:t>9/26/2021</a:t>
             </a:fld>
             <a:endParaRPr lang="en-US"/>
           </a:p>
@@ -4009,6 +4074,602 @@
 </p:sldLayout>
 </file>
 
+<file path=ppt/slideLayouts/slideLayout25.xml><?xml version="1.0" encoding="utf-8"?>
+<p:sldLayout xmlns:a="http://schemas.openxmlformats.org/drawingml/2006/main" xmlns:r="http://schemas.openxmlformats.org/officeDocument/2006/relationships" xmlns:p="http://schemas.openxmlformats.org/presentationml/2006/main" matchingName="Title and Content">
+  <p:cSld name="1_Title and Content">
+    <p:spTree>
+      <p:nvGrpSpPr>
+        <p:cNvPr id="1" name="Shape 53"/>
+        <p:cNvGrpSpPr/>
+        <p:nvPr/>
+      </p:nvGrpSpPr>
+      <p:grpSpPr>
+        <a:xfrm>
+          <a:off x="0" y="0"/>
+          <a:ext cx="0" cy="0"/>
+          <a:chOff x="0" y="0"/>
+          <a:chExt cx="0" cy="0"/>
+        </a:xfrm>
+      </p:grpSpPr>
+      <p:grpSp>
+        <p:nvGrpSpPr>
+          <p:cNvPr id="54" name="Google Shape;54;p14"/>
+          <p:cNvGrpSpPr/>
+          <p:nvPr/>
+        </p:nvGrpSpPr>
+        <p:grpSpPr>
+          <a:xfrm>
+            <a:off x="0" y="7372875"/>
+            <a:ext cx="13849756" cy="400074"/>
+            <a:chOff x="0" y="7372350"/>
+            <a:chExt cx="13817700" cy="400053"/>
+          </a:xfrm>
+        </p:grpSpPr>
+        <p:sp>
+          <p:nvSpPr>
+            <p:cNvPr id="55" name="Google Shape;55;p14"/>
+            <p:cNvSpPr/>
+            <p:nvPr/>
+          </p:nvSpPr>
+          <p:spPr>
+            <a:xfrm>
+              <a:off x="0" y="7372350"/>
+              <a:ext cx="13817700" cy="399900"/>
+            </a:xfrm>
+            <a:prstGeom prst="rect">
+              <a:avLst/>
+            </a:prstGeom>
+            <a:solidFill>
+              <a:schemeClr val="dk2"/>
+            </a:solidFill>
+            <a:ln>
+              <a:noFill/>
+            </a:ln>
+          </p:spPr>
+          <p:txBody>
+            <a:bodyPr spcFirstLastPara="1" wrap="square" lIns="60500" tIns="30250" rIns="60500" bIns="30250" anchor="ctr" anchorCtr="0">
+              <a:noAutofit/>
+            </a:bodyPr>
+            <a:lstStyle/>
+            <a:p>
+              <a:pPr marL="0" marR="0" lvl="0" indent="0" algn="ctr" rtl="0">
+                <a:spcBef>
+                  <a:spcPts val="0"/>
+                </a:spcBef>
+                <a:spcAft>
+                  <a:spcPts val="0"/>
+                </a:spcAft>
+                <a:buNone/>
+              </a:pPr>
+              <a:endParaRPr sz="1964" b="0" i="0" u="none" strike="noStrike" cap="none">
+                <a:solidFill>
+                  <a:schemeClr val="lt1"/>
+                </a:solidFill>
+                <a:latin typeface="Arial"/>
+                <a:ea typeface="Arial"/>
+                <a:cs typeface="Arial"/>
+                <a:sym typeface="Arial"/>
+              </a:endParaRPr>
+            </a:p>
+          </p:txBody>
+        </p:sp>
+        <p:pic>
+          <p:nvPicPr>
+            <p:cNvPr id="56" name="Google Shape;56;p14"/>
+            <p:cNvPicPr preferRelativeResize="0"/>
+            <p:nvPr/>
+          </p:nvPicPr>
+          <p:blipFill rotWithShape="1">
+            <a:blip r:embed="rId2">
+              <a:alphaModFix/>
+            </a:blip>
+            <a:srcRect/>
+            <a:stretch/>
+          </p:blipFill>
+          <p:spPr>
+            <a:xfrm>
+              <a:off x="152257" y="7372351"/>
+              <a:ext cx="1788558" cy="400050"/>
+            </a:xfrm>
+            <a:prstGeom prst="rect">
+              <a:avLst/>
+            </a:prstGeom>
+            <a:noFill/>
+            <a:ln>
+              <a:noFill/>
+            </a:ln>
+          </p:spPr>
+        </p:pic>
+        <p:sp>
+          <p:nvSpPr>
+            <p:cNvPr id="57" name="Google Shape;57;p14"/>
+            <p:cNvSpPr/>
+            <p:nvPr/>
+          </p:nvSpPr>
+          <p:spPr>
+            <a:xfrm>
+              <a:off x="0" y="7372351"/>
+              <a:ext cx="13817700" cy="399900"/>
+            </a:xfrm>
+            <a:prstGeom prst="rect">
+              <a:avLst/>
+            </a:prstGeom>
+            <a:solidFill>
+              <a:schemeClr val="dk2"/>
+            </a:solidFill>
+            <a:ln>
+              <a:noFill/>
+            </a:ln>
+          </p:spPr>
+          <p:txBody>
+            <a:bodyPr spcFirstLastPara="1" wrap="square" lIns="60500" tIns="30250" rIns="60500" bIns="30250" anchor="ctr" anchorCtr="0">
+              <a:noAutofit/>
+            </a:bodyPr>
+            <a:lstStyle/>
+            <a:p>
+              <a:pPr marL="0" marR="0" lvl="0" indent="0" algn="ctr" rtl="0">
+                <a:spcBef>
+                  <a:spcPts val="0"/>
+                </a:spcBef>
+                <a:spcAft>
+                  <a:spcPts val="0"/>
+                </a:spcAft>
+                <a:buNone/>
+              </a:pPr>
+              <a:endParaRPr sz="1964" b="0" i="0" u="none" strike="noStrike" cap="none">
+                <a:solidFill>
+                  <a:schemeClr val="lt1"/>
+                </a:solidFill>
+                <a:latin typeface="Arial"/>
+                <a:ea typeface="Arial"/>
+                <a:cs typeface="Arial"/>
+                <a:sym typeface="Arial"/>
+              </a:endParaRPr>
+            </a:p>
+          </p:txBody>
+        </p:sp>
+        <p:pic>
+          <p:nvPicPr>
+            <p:cNvPr id="58" name="Google Shape;58;p14"/>
+            <p:cNvPicPr preferRelativeResize="0"/>
+            <p:nvPr/>
+          </p:nvPicPr>
+          <p:blipFill rotWithShape="1">
+            <a:blip r:embed="rId2">
+              <a:alphaModFix/>
+            </a:blip>
+            <a:srcRect/>
+            <a:stretch/>
+          </p:blipFill>
+          <p:spPr>
+            <a:xfrm>
+              <a:off x="152257" y="7372352"/>
+              <a:ext cx="1788558" cy="400050"/>
+            </a:xfrm>
+            <a:prstGeom prst="rect">
+              <a:avLst/>
+            </a:prstGeom>
+            <a:noFill/>
+            <a:ln>
+              <a:noFill/>
+            </a:ln>
+          </p:spPr>
+        </p:pic>
+      </p:grpSp>
+      <p:sp>
+        <p:nvSpPr>
+          <p:cNvPr id="59" name="Google Shape;59;p14"/>
+          <p:cNvSpPr txBox="1">
+            <a:spLocks noGrp="1"/>
+          </p:cNvSpPr>
+          <p:nvPr>
+            <p:ph type="title"/>
+          </p:nvPr>
+        </p:nvSpPr>
+        <p:spPr>
+          <a:xfrm>
+            <a:off x="628075" y="905258"/>
+            <a:ext cx="12561413" cy="1015467"/>
+          </a:xfrm>
+          <a:prstGeom prst="rect">
+            <a:avLst/>
+          </a:prstGeom>
+          <a:noFill/>
+          <a:ln>
+            <a:noFill/>
+          </a:ln>
+        </p:spPr>
+        <p:txBody>
+          <a:bodyPr spcFirstLastPara="1" wrap="square" lIns="60500" tIns="60500" rIns="60500" bIns="60500" anchor="b" anchorCtr="0">
+            <a:noAutofit/>
+          </a:bodyPr>
+          <a:lstStyle>
+            <a:lvl1pPr marR="0" lvl="0" algn="l" rtl="0">
+              <a:spcBef>
+                <a:spcPts val="0"/>
+              </a:spcBef>
+              <a:spcAft>
+                <a:spcPts val="0"/>
+              </a:spcAft>
+              <a:buClr>
+                <a:schemeClr val="dk2"/>
+              </a:buClr>
+              <a:buSzPts val="3600"/>
+              <a:buFont typeface="Arial"/>
+              <a:buNone/>
+              <a:defRPr sz="5440" b="0" i="0" u="none" strike="noStrike" cap="none">
+                <a:solidFill>
+                  <a:schemeClr val="dk2"/>
+                </a:solidFill>
+                <a:latin typeface="Arial"/>
+                <a:ea typeface="Arial"/>
+                <a:cs typeface="Arial"/>
+                <a:sym typeface="Arial"/>
+              </a:defRPr>
+            </a:lvl1pPr>
+            <a:lvl2pPr lvl="1" rtl="0">
+              <a:spcBef>
+                <a:spcPts val="0"/>
+              </a:spcBef>
+              <a:spcAft>
+                <a:spcPts val="0"/>
+              </a:spcAft>
+              <a:buSzPts val="900"/>
+              <a:buNone/>
+              <a:defRPr sz="1813"/>
+            </a:lvl2pPr>
+            <a:lvl3pPr lvl="2" rtl="0">
+              <a:spcBef>
+                <a:spcPts val="0"/>
+              </a:spcBef>
+              <a:spcAft>
+                <a:spcPts val="0"/>
+              </a:spcAft>
+              <a:buSzPts val="900"/>
+              <a:buNone/>
+              <a:defRPr sz="1813"/>
+            </a:lvl3pPr>
+            <a:lvl4pPr lvl="3" rtl="0">
+              <a:spcBef>
+                <a:spcPts val="0"/>
+              </a:spcBef>
+              <a:spcAft>
+                <a:spcPts val="0"/>
+              </a:spcAft>
+              <a:buSzPts val="900"/>
+              <a:buNone/>
+              <a:defRPr sz="1813"/>
+            </a:lvl4pPr>
+            <a:lvl5pPr lvl="4" rtl="0">
+              <a:spcBef>
+                <a:spcPts val="0"/>
+              </a:spcBef>
+              <a:spcAft>
+                <a:spcPts val="0"/>
+              </a:spcAft>
+              <a:buSzPts val="900"/>
+              <a:buNone/>
+              <a:defRPr sz="1813"/>
+            </a:lvl5pPr>
+            <a:lvl6pPr lvl="5" rtl="0">
+              <a:spcBef>
+                <a:spcPts val="0"/>
+              </a:spcBef>
+              <a:spcAft>
+                <a:spcPts val="0"/>
+              </a:spcAft>
+              <a:buSzPts val="900"/>
+              <a:buNone/>
+              <a:defRPr sz="1813"/>
+            </a:lvl6pPr>
+            <a:lvl7pPr lvl="6" rtl="0">
+              <a:spcBef>
+                <a:spcPts val="0"/>
+              </a:spcBef>
+              <a:spcAft>
+                <a:spcPts val="0"/>
+              </a:spcAft>
+              <a:buSzPts val="900"/>
+              <a:buNone/>
+              <a:defRPr sz="1813"/>
+            </a:lvl7pPr>
+            <a:lvl8pPr lvl="7" rtl="0">
+              <a:spcBef>
+                <a:spcPts val="0"/>
+              </a:spcBef>
+              <a:spcAft>
+                <a:spcPts val="0"/>
+              </a:spcAft>
+              <a:buSzPts val="900"/>
+              <a:buNone/>
+              <a:defRPr sz="1813"/>
+            </a:lvl8pPr>
+            <a:lvl9pPr lvl="8" rtl="0">
+              <a:spcBef>
+                <a:spcPts val="0"/>
+              </a:spcBef>
+              <a:spcAft>
+                <a:spcPts val="0"/>
+              </a:spcAft>
+              <a:buSzPts val="900"/>
+              <a:buNone/>
+              <a:defRPr sz="1813"/>
+            </a:lvl9pPr>
+          </a:lstStyle>
+          <a:p>
+            <a:endParaRPr/>
+          </a:p>
+        </p:txBody>
+      </p:sp>
+      <p:sp>
+        <p:nvSpPr>
+          <p:cNvPr id="60" name="Google Shape;60;p14"/>
+          <p:cNvSpPr txBox="1">
+            <a:spLocks noGrp="1"/>
+          </p:cNvSpPr>
+          <p:nvPr>
+            <p:ph type="body" idx="1"/>
+          </p:nvPr>
+        </p:nvSpPr>
+        <p:spPr>
+          <a:xfrm>
+            <a:off x="628075" y="2487883"/>
+            <a:ext cx="12561413" cy="2015520"/>
+          </a:xfrm>
+          <a:prstGeom prst="rect">
+            <a:avLst/>
+          </a:prstGeom>
+          <a:noFill/>
+          <a:ln>
+            <a:noFill/>
+          </a:ln>
+        </p:spPr>
+        <p:txBody>
+          <a:bodyPr spcFirstLastPara="1" wrap="square" lIns="60500" tIns="60500" rIns="60500" bIns="60500" anchor="t" anchorCtr="0">
+            <a:noAutofit/>
+          </a:bodyPr>
+          <a:lstStyle>
+            <a:lvl1pPr marL="690875" marR="0" lvl="0" indent="-460583" algn="l" rtl="0">
+              <a:lnSpc>
+                <a:spcPct val="120000"/>
+              </a:lnSpc>
+              <a:spcBef>
+                <a:spcPts val="604"/>
+              </a:spcBef>
+              <a:spcAft>
+                <a:spcPts val="0"/>
+              </a:spcAft>
+              <a:buClr>
+                <a:schemeClr val="dk1"/>
+              </a:buClr>
+              <a:buSzPts val="1200"/>
+              <a:buFont typeface="Arial"/>
+              <a:buChar char="•"/>
+              <a:defRPr sz="1813" b="0" i="0" u="none" strike="noStrike" cap="none">
+                <a:solidFill>
+                  <a:schemeClr val="dk1"/>
+                </a:solidFill>
+                <a:latin typeface="Proxima Nova"/>
+                <a:ea typeface="Proxima Nova"/>
+                <a:cs typeface="Proxima Nova"/>
+                <a:sym typeface="Proxima Nova"/>
+              </a:defRPr>
+            </a:lvl1pPr>
+            <a:lvl2pPr marL="1381750" marR="0" lvl="1" indent="-450988" algn="l" rtl="0">
+              <a:lnSpc>
+                <a:spcPct val="120000"/>
+              </a:lnSpc>
+              <a:spcBef>
+                <a:spcPts val="604"/>
+              </a:spcBef>
+              <a:spcAft>
+                <a:spcPts val="0"/>
+              </a:spcAft>
+              <a:buClr>
+                <a:schemeClr val="dk1"/>
+              </a:buClr>
+              <a:buSzPts val="1100"/>
+              <a:buFont typeface="Arial"/>
+              <a:buChar char="–"/>
+              <a:defRPr sz="1662" b="0" i="0" u="none" strike="noStrike" cap="none">
+                <a:solidFill>
+                  <a:schemeClr val="dk1"/>
+                </a:solidFill>
+                <a:latin typeface="Proxima Nova"/>
+                <a:ea typeface="Proxima Nova"/>
+                <a:cs typeface="Proxima Nova"/>
+                <a:sym typeface="Proxima Nova"/>
+              </a:defRPr>
+            </a:lvl2pPr>
+            <a:lvl3pPr marL="2072625" marR="0" lvl="2" indent="-450988" algn="l" rtl="0">
+              <a:lnSpc>
+                <a:spcPct val="120000"/>
+              </a:lnSpc>
+              <a:spcBef>
+                <a:spcPts val="604"/>
+              </a:spcBef>
+              <a:spcAft>
+                <a:spcPts val="0"/>
+              </a:spcAft>
+              <a:buClr>
+                <a:schemeClr val="dk1"/>
+              </a:buClr>
+              <a:buSzPts val="1100"/>
+              <a:buFont typeface="Arial"/>
+              <a:buChar char="•"/>
+              <a:defRPr sz="1662" b="0" i="0" u="none" strike="noStrike" cap="none">
+                <a:solidFill>
+                  <a:schemeClr val="dk1"/>
+                </a:solidFill>
+                <a:latin typeface="Proxima Nova"/>
+                <a:ea typeface="Proxima Nova"/>
+                <a:cs typeface="Proxima Nova"/>
+                <a:sym typeface="Proxima Nova"/>
+              </a:defRPr>
+            </a:lvl3pPr>
+            <a:lvl4pPr marL="2763500" marR="0" lvl="3" indent="-450988" algn="l" rtl="0">
+              <a:lnSpc>
+                <a:spcPct val="120000"/>
+              </a:lnSpc>
+              <a:spcBef>
+                <a:spcPts val="604"/>
+              </a:spcBef>
+              <a:spcAft>
+                <a:spcPts val="0"/>
+              </a:spcAft>
+              <a:buClr>
+                <a:schemeClr val="dk1"/>
+              </a:buClr>
+              <a:buSzPts val="1100"/>
+              <a:buFont typeface="Arial"/>
+              <a:buChar char="–"/>
+              <a:defRPr sz="1662" b="0" i="0" u="none" strike="noStrike" cap="none">
+                <a:solidFill>
+                  <a:schemeClr val="dk1"/>
+                </a:solidFill>
+                <a:latin typeface="Proxima Nova"/>
+                <a:ea typeface="Proxima Nova"/>
+                <a:cs typeface="Proxima Nova"/>
+                <a:sym typeface="Proxima Nova"/>
+              </a:defRPr>
+            </a:lvl4pPr>
+            <a:lvl5pPr marL="3454375" marR="0" lvl="4" indent="-450988" algn="l" rtl="0">
+              <a:spcBef>
+                <a:spcPts val="604"/>
+              </a:spcBef>
+              <a:spcAft>
+                <a:spcPts val="0"/>
+              </a:spcAft>
+              <a:buClr>
+                <a:schemeClr val="dk1"/>
+              </a:buClr>
+              <a:buSzPts val="1100"/>
+              <a:buFont typeface="Arial"/>
+              <a:buChar char="»"/>
+              <a:defRPr sz="1662" b="0" i="0" u="none" strike="noStrike" cap="none">
+                <a:solidFill>
+                  <a:schemeClr val="dk1"/>
+                </a:solidFill>
+                <a:latin typeface="Source Sans Pro"/>
+                <a:ea typeface="Source Sans Pro"/>
+                <a:cs typeface="Source Sans Pro"/>
+                <a:sym typeface="Source Sans Pro"/>
+              </a:defRPr>
+            </a:lvl5pPr>
+            <a:lvl6pPr marL="4145250" marR="0" lvl="5" indent="-537347" algn="l" rtl="0">
+              <a:spcBef>
+                <a:spcPts val="604"/>
+              </a:spcBef>
+              <a:spcAft>
+                <a:spcPts val="0"/>
+              </a:spcAft>
+              <a:buClr>
+                <a:schemeClr val="dk1"/>
+              </a:buClr>
+              <a:buSzPts val="2000"/>
+              <a:buFont typeface="Arial"/>
+              <a:buChar char="•"/>
+              <a:defRPr sz="3022" b="0" i="0" u="none" strike="noStrike" cap="none">
+                <a:solidFill>
+                  <a:schemeClr val="dk1"/>
+                </a:solidFill>
+                <a:latin typeface="Arial"/>
+                <a:ea typeface="Arial"/>
+                <a:cs typeface="Arial"/>
+                <a:sym typeface="Arial"/>
+              </a:defRPr>
+            </a:lvl6pPr>
+            <a:lvl7pPr marL="4836124" marR="0" lvl="6" indent="-537347" algn="l" rtl="0">
+              <a:spcBef>
+                <a:spcPts val="604"/>
+              </a:spcBef>
+              <a:spcAft>
+                <a:spcPts val="0"/>
+              </a:spcAft>
+              <a:buClr>
+                <a:schemeClr val="dk1"/>
+              </a:buClr>
+              <a:buSzPts val="2000"/>
+              <a:buFont typeface="Arial"/>
+              <a:buChar char="•"/>
+              <a:defRPr sz="3022" b="0" i="0" u="none" strike="noStrike" cap="none">
+                <a:solidFill>
+                  <a:schemeClr val="dk1"/>
+                </a:solidFill>
+                <a:latin typeface="Arial"/>
+                <a:ea typeface="Arial"/>
+                <a:cs typeface="Arial"/>
+                <a:sym typeface="Arial"/>
+              </a:defRPr>
+            </a:lvl7pPr>
+            <a:lvl8pPr marL="5526999" marR="0" lvl="7" indent="-537347" algn="l" rtl="0">
+              <a:spcBef>
+                <a:spcPts val="604"/>
+              </a:spcBef>
+              <a:spcAft>
+                <a:spcPts val="0"/>
+              </a:spcAft>
+              <a:buClr>
+                <a:schemeClr val="dk1"/>
+              </a:buClr>
+              <a:buSzPts val="2000"/>
+              <a:buFont typeface="Arial"/>
+              <a:buChar char="•"/>
+              <a:defRPr sz="3022" b="0" i="0" u="none" strike="noStrike" cap="none">
+                <a:solidFill>
+                  <a:schemeClr val="dk1"/>
+                </a:solidFill>
+                <a:latin typeface="Arial"/>
+                <a:ea typeface="Arial"/>
+                <a:cs typeface="Arial"/>
+                <a:sym typeface="Arial"/>
+              </a:defRPr>
+            </a:lvl8pPr>
+            <a:lvl9pPr marL="6217874" marR="0" lvl="8" indent="-537347" algn="l" rtl="0">
+              <a:spcBef>
+                <a:spcPts val="604"/>
+              </a:spcBef>
+              <a:spcAft>
+                <a:spcPts val="0"/>
+              </a:spcAft>
+              <a:buClr>
+                <a:schemeClr val="dk1"/>
+              </a:buClr>
+              <a:buSzPts val="2000"/>
+              <a:buFont typeface="Arial"/>
+              <a:buChar char="•"/>
+              <a:defRPr sz="3022" b="0" i="0" u="none" strike="noStrike" cap="none">
+                <a:solidFill>
+                  <a:schemeClr val="dk1"/>
+                </a:solidFill>
+                <a:latin typeface="Arial"/>
+                <a:ea typeface="Arial"/>
+                <a:cs typeface="Arial"/>
+                <a:sym typeface="Arial"/>
+              </a:defRPr>
+            </a:lvl9pPr>
+          </a:lstStyle>
+          <a:p>
+            <a:endParaRPr/>
+          </a:p>
+        </p:txBody>
+      </p:sp>
+    </p:spTree>
+    <p:extLst>
+      <p:ext uri="{BB962C8B-B14F-4D97-AF65-F5344CB8AC3E}">
+        <p14:creationId xmlns:p14="http://schemas.microsoft.com/office/powerpoint/2010/main" val="2070677547"/>
+      </p:ext>
+    </p:extLst>
+  </p:cSld>
+  <p:clrMapOvr>
+    <a:masterClrMapping/>
+  </p:clrMapOvr>
+  <p:transition>
+    <p:fade/>
+  </p:transition>
+</p:sldLayout>
+</file>
+
 <file path=ppt/slideLayouts/slideLayout3.xml><?xml version="1.0" encoding="utf-8"?>
 <p:sldLayout xmlns:a="http://schemas.openxmlformats.org/drawingml/2006/main" xmlns:r="http://schemas.openxmlformats.org/officeDocument/2006/relationships" xmlns:p="http://schemas.openxmlformats.org/presentationml/2006/main" preserve="1" userDrawn="1">
   <p:cSld name="Title Green Ram CSU">
@@ -6314,6 +6975,7 @@
     <p:sldLayoutId id="2147483677" r:id="rId22"/>
     <p:sldLayoutId id="2147483692" r:id="rId23"/>
     <p:sldLayoutId id="2147483672" r:id="rId24"/>
+    <p:sldLayoutId id="2147483693" r:id="rId25"/>
   </p:sldLayoutIdLst>
   <mc:AlternateContent xmlns:mc="http://schemas.openxmlformats.org/markup-compatibility/2006" xmlns:p14="http://schemas.microsoft.com/office/powerpoint/2010/main">
     <mc:Choice Requires="p14">
@@ -6728,6 +7390,600 @@
           <p:cNvPr id="4" name="Title 3">
             <a:extLst>
               <a:ext uri="{FF2B5EF4-FFF2-40B4-BE49-F238E27FC236}">
+                <a16:creationId xmlns:a16="http://schemas.microsoft.com/office/drawing/2014/main" id="{119AD8F2-D5DB-A84B-A5B3-F7935E3E6D1D}"/>
+              </a:ext>
+            </a:extLst>
+          </p:cNvPr>
+          <p:cNvSpPr>
+            <a:spLocks noGrp="1"/>
+          </p:cNvSpPr>
+          <p:nvPr>
+            <p:ph type="title"/>
+          </p:nvPr>
+        </p:nvSpPr>
+        <p:spPr>
+          <a:xfrm>
+            <a:off x="628076" y="607804"/>
+            <a:ext cx="5642096" cy="916848"/>
+          </a:xfrm>
+        </p:spPr>
+        <p:txBody>
+          <a:bodyPr/>
+          <a:lstStyle/>
+          <a:p>
+            <a:r>
+              <a:rPr lang="en-US" dirty="0"/>
+              <a:t>Announcements</a:t>
+            </a:r>
+          </a:p>
+        </p:txBody>
+      </p:sp>
+      <p:sp>
+        <p:nvSpPr>
+          <p:cNvPr id="5" name="Text Placeholder 4">
+            <a:extLst>
+              <a:ext uri="{FF2B5EF4-FFF2-40B4-BE49-F238E27FC236}">
+                <a16:creationId xmlns:a16="http://schemas.microsoft.com/office/drawing/2014/main" id="{1BBD0DB5-379A-304F-9307-E7B1A89B08F7}"/>
+              </a:ext>
+            </a:extLst>
+          </p:cNvPr>
+          <p:cNvSpPr>
+            <a:spLocks noGrp="1"/>
+          </p:cNvSpPr>
+          <p:nvPr>
+            <p:ph type="body" idx="1"/>
+          </p:nvPr>
+        </p:nvSpPr>
+        <p:spPr>
+          <a:xfrm>
+            <a:off x="628075" y="1647163"/>
+            <a:ext cx="8395419" cy="4379259"/>
+          </a:xfrm>
+        </p:spPr>
+        <p:txBody>
+          <a:bodyPr/>
+          <a:lstStyle/>
+          <a:p>
+            <a:pPr marL="930762" lvl="1" indent="0">
+              <a:buNone/>
+            </a:pPr>
+            <a:endParaRPr lang="en-US" dirty="0"/>
+          </a:p>
+          <a:p>
+            <a:r>
+              <a:rPr lang="en-US" dirty="0"/>
+              <a:t>Reminder – readings are due </a:t>
+            </a:r>
+            <a:r>
+              <a:rPr lang="en-US" b="1" dirty="0"/>
+              <a:t>before</a:t>
+            </a:r>
+            <a:r>
+              <a:rPr lang="en-US" dirty="0"/>
+              <a:t> lecture</a:t>
+            </a:r>
+          </a:p>
+          <a:p>
+            <a:pPr lvl="1"/>
+            <a:r>
+              <a:rPr lang="en-US" dirty="0"/>
+              <a:t>You don’t have to do all of it - challenge problems can be challenging…</a:t>
+            </a:r>
+          </a:p>
+          <a:p>
+            <a:pPr lvl="1"/>
+            <a:r>
+              <a:rPr lang="en-US" dirty="0"/>
+              <a:t>You can return to them. </a:t>
+            </a:r>
+          </a:p>
+          <a:p>
+            <a:pPr lvl="1"/>
+            <a:r>
+              <a:rPr lang="en-US" dirty="0"/>
+              <a:t>We start off each lecture with a quiz from your reading! </a:t>
+            </a:r>
+          </a:p>
+          <a:p>
+            <a:r>
+              <a:rPr lang="en-US" dirty="0"/>
+              <a:t>Make sure to review knowledge checks and spread out their use! </a:t>
+            </a:r>
+          </a:p>
+        </p:txBody>
+      </p:sp>
+      <p:sp>
+        <p:nvSpPr>
+          <p:cNvPr id="6" name="TextBox 5">
+            <a:extLst>
+              <a:ext uri="{FF2B5EF4-FFF2-40B4-BE49-F238E27FC236}">
+                <a16:creationId xmlns:a16="http://schemas.microsoft.com/office/drawing/2014/main" id="{32A3B87A-BBC0-704B-AC99-3984206450D5}"/>
+              </a:ext>
+            </a:extLst>
+          </p:cNvPr>
+          <p:cNvSpPr txBox="1"/>
+          <p:nvPr/>
+        </p:nvSpPr>
+        <p:spPr>
+          <a:xfrm>
+            <a:off x="9744412" y="2150737"/>
+            <a:ext cx="3892958" cy="2417650"/>
+          </a:xfrm>
+          <a:prstGeom prst="rect">
+            <a:avLst/>
+          </a:prstGeom>
+          <a:noFill/>
+        </p:spPr>
+        <p:txBody>
+          <a:bodyPr wrap="square" rtlCol="0">
+            <a:spAutoFit/>
+          </a:bodyPr>
+          <a:lstStyle/>
+          <a:p>
+            <a:r>
+              <a:rPr lang="en-US" sz="3022" dirty="0" err="1"/>
+              <a:t>Todo</a:t>
+            </a:r>
+            <a:r>
+              <a:rPr lang="en-US" sz="3022" dirty="0"/>
+              <a:t>:</a:t>
+            </a:r>
+          </a:p>
+          <a:p>
+            <a:r>
+              <a:rPr lang="en-US" sz="3022" dirty="0"/>
+              <a:t>Continue Practical 2 (should be started!)</a:t>
+            </a:r>
+          </a:p>
+          <a:p>
+            <a:endParaRPr lang="en-US" sz="3022" dirty="0"/>
+          </a:p>
+          <a:p>
+            <a:endParaRPr lang="en-US" sz="3022" dirty="0"/>
+          </a:p>
+        </p:txBody>
+      </p:sp>
+      <p:sp>
+        <p:nvSpPr>
+          <p:cNvPr id="3" name="TextBox 2">
+            <a:extLst>
+              <a:ext uri="{FF2B5EF4-FFF2-40B4-BE49-F238E27FC236}">
+                <a16:creationId xmlns:a16="http://schemas.microsoft.com/office/drawing/2014/main" id="{219403AF-FCA0-4FAD-B2CD-E3D24CF8DD27}"/>
+              </a:ext>
+            </a:extLst>
+          </p:cNvPr>
+          <p:cNvSpPr txBox="1"/>
+          <p:nvPr/>
+        </p:nvSpPr>
+        <p:spPr>
+          <a:xfrm>
+            <a:off x="628075" y="6148934"/>
+            <a:ext cx="10580915" cy="1015663"/>
+          </a:xfrm>
+          <a:prstGeom prst="rect">
+            <a:avLst/>
+          </a:prstGeom>
+          <a:noFill/>
+        </p:spPr>
+        <p:txBody>
+          <a:bodyPr wrap="square" rtlCol="0">
+            <a:spAutoFit/>
+          </a:bodyPr>
+          <a:lstStyle/>
+          <a:p>
+            <a:r>
+              <a:rPr lang="en-US" dirty="0"/>
+              <a:t>CS 165 – Next Course In Sequence, also consider CS 220 (math and stats especially) </a:t>
+            </a:r>
+          </a:p>
+          <a:p>
+            <a:r>
+              <a:rPr lang="en-US" dirty="0"/>
+              <a:t>CO Jobs Report 2021 – 77% of new jobs require programming</a:t>
+            </a:r>
+          </a:p>
+          <a:p>
+            <a:r>
+              <a:rPr lang="en-US" dirty="0"/>
+              <a:t>60% of all STEM jobs requires *advanced* (200-300 level) </a:t>
+            </a:r>
+          </a:p>
+        </p:txBody>
+      </p:sp>
+      <p:sp>
+        <p:nvSpPr>
+          <p:cNvPr id="7" name="TextBox 6">
+            <a:extLst>
+              <a:ext uri="{FF2B5EF4-FFF2-40B4-BE49-F238E27FC236}">
+                <a16:creationId xmlns:a16="http://schemas.microsoft.com/office/drawing/2014/main" id="{BF16D510-BC74-4FA5-AFD2-193B039115A5}"/>
+              </a:ext>
+            </a:extLst>
+          </p:cNvPr>
+          <p:cNvSpPr txBox="1"/>
+          <p:nvPr/>
+        </p:nvSpPr>
+        <p:spPr>
+          <a:xfrm>
+            <a:off x="7228114" y="362857"/>
+            <a:ext cx="6125029" cy="1015663"/>
+          </a:xfrm>
+          <a:prstGeom prst="rect">
+            <a:avLst/>
+          </a:prstGeom>
+          <a:solidFill>
+            <a:schemeClr val="accent2"/>
+          </a:solidFill>
+        </p:spPr>
+        <p:txBody>
+          <a:bodyPr wrap="square" rtlCol="0">
+            <a:spAutoFit/>
+          </a:bodyPr>
+          <a:lstStyle/>
+          <a:p>
+            <a:r>
+              <a:rPr lang="en-US" b="1" dirty="0"/>
+              <a:t>Opening Question: </a:t>
+            </a:r>
+          </a:p>
+          <a:p>
+            <a:r>
+              <a:rPr lang="en-US" dirty="0"/>
+              <a:t>How are you studying for this course? Knowledge checks, practice coding assignments, </a:t>
+            </a:r>
+            <a:r>
+              <a:rPr lang="en-US" dirty="0" err="1"/>
+              <a:t>etc</a:t>
+            </a:r>
+            <a:r>
+              <a:rPr lang="en-US" dirty="0"/>
+              <a:t>?</a:t>
+            </a:r>
+          </a:p>
+        </p:txBody>
+      </p:sp>
+    </p:spTree>
+    <p:extLst>
+      <p:ext uri="{BB962C8B-B14F-4D97-AF65-F5344CB8AC3E}">
+        <p14:creationId xmlns:p14="http://schemas.microsoft.com/office/powerpoint/2010/main" val="926474781"/>
+      </p:ext>
+    </p:extLst>
+  </p:cSld>
+  <p:clrMapOvr>
+    <a:masterClrMapping/>
+  </p:clrMapOvr>
+  <p:transition>
+    <p:fade/>
+  </p:transition>
+</p:sld>
+</file>
+
+<file path=ppt/slides/slide3.xml><?xml version="1.0" encoding="utf-8"?>
+<p:sld xmlns:a="http://schemas.openxmlformats.org/drawingml/2006/main" xmlns:r="http://schemas.openxmlformats.org/officeDocument/2006/relationships" xmlns:p="http://schemas.openxmlformats.org/presentationml/2006/main">
+  <p:cSld>
+    <p:spTree>
+      <p:nvGrpSpPr>
+        <p:cNvPr id="1" name=""/>
+        <p:cNvGrpSpPr/>
+        <p:nvPr/>
+      </p:nvGrpSpPr>
+      <p:grpSpPr>
+        <a:xfrm>
+          <a:off x="0" y="0"/>
+          <a:ext cx="0" cy="0"/>
+          <a:chOff x="0" y="0"/>
+          <a:chExt cx="0" cy="0"/>
+        </a:xfrm>
+      </p:grpSpPr>
+      <p:sp>
+        <p:nvSpPr>
+          <p:cNvPr id="2" name="Title 1">
+            <a:extLst>
+              <a:ext uri="{FF2B5EF4-FFF2-40B4-BE49-F238E27FC236}">
+                <a16:creationId xmlns:a16="http://schemas.microsoft.com/office/drawing/2014/main" id="{8105BDF9-F9DA-ED4C-86D3-9EF359A82435}"/>
+              </a:ext>
+            </a:extLst>
+          </p:cNvPr>
+          <p:cNvSpPr>
+            <a:spLocks noGrp="1"/>
+          </p:cNvSpPr>
+          <p:nvPr>
+            <p:ph type="title"/>
+          </p:nvPr>
+        </p:nvSpPr>
+        <p:spPr/>
+        <p:txBody>
+          <a:bodyPr/>
+          <a:lstStyle/>
+          <a:p>
+            <a:r>
+              <a:rPr lang="en-US" dirty="0"/>
+              <a:t>Reading Check – Logical Operators</a:t>
+            </a:r>
+          </a:p>
+        </p:txBody>
+      </p:sp>
+      <p:sp>
+        <p:nvSpPr>
+          <p:cNvPr id="3" name="Text Placeholder 2">
+            <a:extLst>
+              <a:ext uri="{FF2B5EF4-FFF2-40B4-BE49-F238E27FC236}">
+                <a16:creationId xmlns:a16="http://schemas.microsoft.com/office/drawing/2014/main" id="{0B6D0490-2BCC-874D-BED8-E6C939A4E511}"/>
+              </a:ext>
+            </a:extLst>
+          </p:cNvPr>
+          <p:cNvSpPr>
+            <a:spLocks noGrp="1"/>
+          </p:cNvSpPr>
+          <p:nvPr>
+            <p:ph type="body" sz="quarter" idx="10"/>
+          </p:nvPr>
+        </p:nvSpPr>
+        <p:spPr>
+          <a:xfrm>
+            <a:off x="628075" y="1776683"/>
+            <a:ext cx="12561453" cy="4888774"/>
+          </a:xfrm>
+        </p:spPr>
+        <p:txBody>
+          <a:bodyPr vert="horz" lIns="91440" tIns="91440" rIns="91440" bIns="91440" rtlCol="0" anchor="t">
+            <a:spAutoFit/>
+          </a:bodyPr>
+          <a:lstStyle/>
+          <a:p>
+            <a:pPr marL="524510" indent="-524510"/>
+            <a:r>
+              <a:rPr lang="en-US" dirty="0"/>
+              <a:t>Consider the table below:</a:t>
+            </a:r>
+            <a:endParaRPr lang="en-US"/>
+          </a:p>
+          <a:p>
+            <a:pPr marL="524510" indent="-524510"/>
+            <a:endParaRPr lang="en-US" dirty="0"/>
+          </a:p>
+          <a:p>
+            <a:pPr marL="699135" lvl="1" indent="0">
+              <a:buNone/>
+            </a:pPr>
+            <a:endParaRPr lang="en-US" dirty="0"/>
+          </a:p>
+          <a:p>
+            <a:pPr marL="699135" lvl="1" indent="0">
+              <a:buNone/>
+            </a:pPr>
+            <a:endParaRPr lang="en-US" dirty="0"/>
+          </a:p>
+          <a:p>
+            <a:pPr marL="699135" lvl="1" indent="0">
+              <a:buNone/>
+            </a:pPr>
+            <a:endParaRPr lang="en-US" dirty="0"/>
+          </a:p>
+          <a:p>
+            <a:pPr marL="699135" lvl="1" indent="0">
+              <a:buNone/>
+            </a:pPr>
+            <a:endParaRPr lang="en-US" dirty="0"/>
+          </a:p>
+          <a:p>
+            <a:pPr marL="524510" indent="-524510"/>
+            <a:endParaRPr lang="en-US" dirty="0"/>
+          </a:p>
+          <a:p>
+            <a:pPr marL="524510" indent="-524510"/>
+            <a:r>
+              <a:rPr lang="en-US" dirty="0"/>
+              <a:t>Which logical operator is ?:</a:t>
+            </a:r>
+          </a:p>
+          <a:p>
+            <a:pPr marL="342900" indent="-342900">
+              <a:buAutoNum type="alphaUcPeriod"/>
+            </a:pPr>
+            <a:r>
+              <a:rPr lang="en-US" dirty="0"/>
+              <a:t>AND (&amp;&amp;)</a:t>
+            </a:r>
+          </a:p>
+          <a:p>
+            <a:pPr marL="342900" indent="-342900">
+              <a:buAutoNum type="alphaUcPeriod"/>
+            </a:pPr>
+            <a:r>
+              <a:rPr lang="en-US" dirty="0"/>
+              <a:t>OR (||)</a:t>
+            </a:r>
+          </a:p>
+          <a:p>
+            <a:pPr marL="342900" indent="-342900">
+              <a:buAutoNum type="alphaUcPeriod"/>
+            </a:pPr>
+            <a:r>
+              <a:rPr lang="en-US" dirty="0"/>
+              <a:t>NOT (!)</a:t>
+            </a:r>
+          </a:p>
+        </p:txBody>
+      </p:sp>
+      <p:pic>
+        <p:nvPicPr>
+          <p:cNvPr id="4" name="Picture 3">
+            <a:extLst>
+              <a:ext uri="{FF2B5EF4-FFF2-40B4-BE49-F238E27FC236}">
+                <a16:creationId xmlns:a16="http://schemas.microsoft.com/office/drawing/2014/main" id="{417B400A-D2D4-430A-AC34-82DA7951B365}"/>
+              </a:ext>
+            </a:extLst>
+          </p:cNvPr>
+          <p:cNvPicPr>
+            <a:picLocks noChangeAspect="1"/>
+          </p:cNvPicPr>
+          <p:nvPr/>
+        </p:nvPicPr>
+        <p:blipFill>
+          <a:blip r:embed="rId2"/>
+          <a:stretch>
+            <a:fillRect/>
+          </a:stretch>
+        </p:blipFill>
+        <p:spPr>
+          <a:xfrm>
+            <a:off x="1135209" y="2412930"/>
+            <a:ext cx="3381375" cy="1933575"/>
+          </a:xfrm>
+          <a:prstGeom prst="rect">
+            <a:avLst/>
+          </a:prstGeom>
+        </p:spPr>
+      </p:pic>
+      <mc:AlternateContent xmlns:mc="http://schemas.openxmlformats.org/markup-compatibility/2006">
+        <mc:Choice xmlns:p14="http://schemas.microsoft.com/office/powerpoint/2010/main" Requires="p14">
+          <p:contentPart p14:bwMode="auto" r:id="rId3">
+            <p14:nvContentPartPr>
+              <p14:cNvPr id="8" name="Ink 7">
+                <a:extLst>
+                  <a:ext uri="{FF2B5EF4-FFF2-40B4-BE49-F238E27FC236}">
+                    <a16:creationId xmlns:a16="http://schemas.microsoft.com/office/drawing/2014/main" id="{DA9F3E6B-39A5-4581-940B-C91546280994}"/>
+                  </a:ext>
+                </a:extLst>
+              </p14:cNvPr>
+              <p14:cNvContentPartPr/>
+              <p14:nvPr/>
+            </p14:nvContentPartPr>
+            <p14:xfrm>
+              <a:off x="3394989" y="2579337"/>
+              <a:ext cx="199440" cy="124200"/>
+            </p14:xfrm>
+          </p:contentPart>
+        </mc:Choice>
+        <mc:Fallback>
+          <p:pic>
+            <p:nvPicPr>
+              <p:cNvPr id="8" name="Ink 7">
+                <a:extLst>
+                  <a:ext uri="{FF2B5EF4-FFF2-40B4-BE49-F238E27FC236}">
+                    <a16:creationId xmlns:a16="http://schemas.microsoft.com/office/drawing/2014/main" id="{DA9F3E6B-39A5-4581-940B-C91546280994}"/>
+                  </a:ext>
+                </a:extLst>
+              </p:cNvPr>
+              <p:cNvPicPr/>
+              <p:nvPr/>
+            </p:nvPicPr>
+            <p:blipFill>
+              <a:blip r:embed="rId4"/>
+              <a:stretch>
+                <a:fillRect/>
+              </a:stretch>
+            </p:blipFill>
+            <p:spPr>
+              <a:xfrm>
+                <a:off x="3340989" y="2471697"/>
+                <a:ext cx="307080" cy="339840"/>
+              </a:xfrm>
+              <a:prstGeom prst="rect">
+                <a:avLst/>
+              </a:prstGeom>
+            </p:spPr>
+          </p:pic>
+        </mc:Fallback>
+      </mc:AlternateContent>
+      <mc:AlternateContent xmlns:mc="http://schemas.openxmlformats.org/markup-compatibility/2006">
+        <mc:Choice xmlns:p14="http://schemas.microsoft.com/office/powerpoint/2010/main" Requires="p14">
+          <p:contentPart p14:bwMode="auto" r:id="rId5">
+            <p14:nvContentPartPr>
+              <p14:cNvPr id="12" name="Ink 11">
+                <a:extLst>
+                  <a:ext uri="{FF2B5EF4-FFF2-40B4-BE49-F238E27FC236}">
+                    <a16:creationId xmlns:a16="http://schemas.microsoft.com/office/drawing/2014/main" id="{C9EAD53D-80EC-4C60-9E38-F442A4A1B33C}"/>
+                  </a:ext>
+                </a:extLst>
+              </p14:cNvPr>
+              <p14:cNvContentPartPr/>
+              <p14:nvPr/>
+            </p14:nvContentPartPr>
+            <p14:xfrm>
+              <a:off x="3759309" y="4844097"/>
+              <a:ext cx="140760" cy="194760"/>
+            </p14:xfrm>
+          </p:contentPart>
+        </mc:Choice>
+        <mc:Fallback>
+          <p:pic>
+            <p:nvPicPr>
+              <p:cNvPr id="12" name="Ink 11">
+                <a:extLst>
+                  <a:ext uri="{FF2B5EF4-FFF2-40B4-BE49-F238E27FC236}">
+                    <a16:creationId xmlns:a16="http://schemas.microsoft.com/office/drawing/2014/main" id="{C9EAD53D-80EC-4C60-9E38-F442A4A1B33C}"/>
+                  </a:ext>
+                </a:extLst>
+              </p:cNvPr>
+              <p:cNvPicPr/>
+              <p:nvPr/>
+            </p:nvPicPr>
+            <p:blipFill>
+              <a:blip r:embed="rId6"/>
+              <a:stretch>
+                <a:fillRect/>
+              </a:stretch>
+            </p:blipFill>
+            <p:spPr>
+              <a:xfrm>
+                <a:off x="3705669" y="4736097"/>
+                <a:ext cx="248400" cy="410400"/>
+              </a:xfrm>
+              <a:prstGeom prst="rect">
+                <a:avLst/>
+              </a:prstGeom>
+            </p:spPr>
+          </p:pic>
+        </mc:Fallback>
+      </mc:AlternateContent>
+    </p:spTree>
+    <p:extLst>
+      <p:ext uri="{BB962C8B-B14F-4D97-AF65-F5344CB8AC3E}">
+        <p14:creationId xmlns:p14="http://schemas.microsoft.com/office/powerpoint/2010/main" val="3399856286"/>
+      </p:ext>
+    </p:extLst>
+  </p:cSld>
+  <p:clrMapOvr>
+    <a:masterClrMapping/>
+  </p:clrMapOvr>
+  <mc:AlternateContent xmlns:mc="http://schemas.openxmlformats.org/markup-compatibility/2006" xmlns:p14="http://schemas.microsoft.com/office/powerpoint/2010/main">
+    <mc:Choice Requires="p14">
+      <p:transition p14:dur="300">
+        <p:fade/>
+      </p:transition>
+    </mc:Choice>
+    <mc:Fallback xmlns="">
+      <p:transition>
+        <p:fade/>
+      </p:transition>
+    </mc:Fallback>
+  </mc:AlternateContent>
+</p:sld>
+</file>
+
+<file path=ppt/slides/slide4.xml><?xml version="1.0" encoding="utf-8"?>
+<p:sld xmlns:a="http://schemas.openxmlformats.org/drawingml/2006/main" xmlns:r="http://schemas.openxmlformats.org/officeDocument/2006/relationships" xmlns:p="http://schemas.openxmlformats.org/presentationml/2006/main">
+  <p:cSld>
+    <p:spTree>
+      <p:nvGrpSpPr>
+        <p:cNvPr id="1" name=""/>
+        <p:cNvGrpSpPr/>
+        <p:nvPr/>
+      </p:nvGrpSpPr>
+      <p:grpSpPr>
+        <a:xfrm>
+          <a:off x="0" y="0"/>
+          <a:ext cx="0" cy="0"/>
+          <a:chOff x="0" y="0"/>
+          <a:chExt cx="0" cy="0"/>
+        </a:xfrm>
+      </p:grpSpPr>
+      <p:sp>
+        <p:nvSpPr>
+          <p:cNvPr id="4" name="Title 3">
+            <a:extLst>
+              <a:ext uri="{FF2B5EF4-FFF2-40B4-BE49-F238E27FC236}">
                 <a16:creationId xmlns:a16="http://schemas.microsoft.com/office/drawing/2014/main" id="{8E792B92-A7B6-A343-9FDD-B41DF4F4767B}"/>
               </a:ext>
             </a:extLst>
@@ -7552,7 +8808,201 @@
 </p:sld>
 </file>
 
-<file path=ppt/slides/slide3.xml><?xml version="1.0" encoding="utf-8"?>
+<file path=ppt/slides/slide5.xml><?xml version="1.0" encoding="utf-8"?>
+<p:sld xmlns:a="http://schemas.openxmlformats.org/drawingml/2006/main" xmlns:r="http://schemas.openxmlformats.org/officeDocument/2006/relationships" xmlns:p="http://schemas.openxmlformats.org/presentationml/2006/main">
+  <p:cSld>
+    <p:spTree>
+      <p:nvGrpSpPr>
+        <p:cNvPr id="1" name=""/>
+        <p:cNvGrpSpPr/>
+        <p:nvPr/>
+      </p:nvGrpSpPr>
+      <p:grpSpPr>
+        <a:xfrm>
+          <a:off x="0" y="0"/>
+          <a:ext cx="0" cy="0"/>
+          <a:chOff x="0" y="0"/>
+          <a:chExt cx="0" cy="0"/>
+        </a:xfrm>
+      </p:grpSpPr>
+      <p:sp>
+        <p:nvSpPr>
+          <p:cNvPr id="2" name="Title 1">
+            <a:extLst>
+              <a:ext uri="{FF2B5EF4-FFF2-40B4-BE49-F238E27FC236}">
+                <a16:creationId xmlns:a16="http://schemas.microsoft.com/office/drawing/2014/main" id="{F480792B-59FA-4F29-BA57-194698BE909E}"/>
+              </a:ext>
+            </a:extLst>
+          </p:cNvPr>
+          <p:cNvSpPr>
+            <a:spLocks noGrp="1"/>
+          </p:cNvSpPr>
+          <p:nvPr>
+            <p:ph type="title"/>
+          </p:nvPr>
+        </p:nvSpPr>
+        <p:spPr/>
+        <p:txBody>
+          <a:bodyPr/>
+          <a:lstStyle/>
+          <a:p>
+            <a:r>
+              <a:rPr lang="en-US" dirty="0"/>
+              <a:t>Warm Up – Object Compare </a:t>
+            </a:r>
+          </a:p>
+        </p:txBody>
+      </p:sp>
+      <p:sp>
+        <p:nvSpPr>
+          <p:cNvPr id="3" name="Text Placeholder 2">
+            <a:extLst>
+              <a:ext uri="{FF2B5EF4-FFF2-40B4-BE49-F238E27FC236}">
+                <a16:creationId xmlns:a16="http://schemas.microsoft.com/office/drawing/2014/main" id="{522BB3DD-EE46-492E-AB9F-78202FE0B544}"/>
+              </a:ext>
+            </a:extLst>
+          </p:cNvPr>
+          <p:cNvSpPr>
+            <a:spLocks noGrp="1"/>
+          </p:cNvSpPr>
+          <p:nvPr>
+            <p:ph type="body" sz="quarter" idx="10"/>
+          </p:nvPr>
+        </p:nvSpPr>
+        <p:spPr>
+          <a:xfrm>
+            <a:off x="628075" y="1776683"/>
+            <a:ext cx="12561453" cy="3816879"/>
+          </a:xfrm>
+        </p:spPr>
+        <p:txBody>
+          <a:bodyPr/>
+          <a:lstStyle/>
+          <a:p>
+            <a:r>
+              <a:rPr lang="en-US" dirty="0"/>
+              <a:t>Objects have to methods to compare (they can’t use the primitive operators!)</a:t>
+            </a:r>
+          </a:p>
+          <a:p>
+            <a:r>
+              <a:rPr lang="en-US" dirty="0"/>
+              <a:t>Write a sentence that uses </a:t>
+            </a:r>
+            <a:r>
+              <a:rPr lang="en-US" b="1" dirty="0"/>
+              <a:t>contains</a:t>
+            </a:r>
+            <a:r>
+              <a:rPr lang="en-US" dirty="0"/>
+              <a:t> to see if any given character in a String is a “</a:t>
+            </a:r>
+            <a:r>
+              <a:rPr lang="en-US" dirty="0" err="1"/>
+              <a:t>AEIOUaeiou</a:t>
+            </a:r>
+            <a:r>
+              <a:rPr lang="en-US" dirty="0"/>
+              <a:t>”</a:t>
+            </a:r>
+          </a:p>
+          <a:p>
+            <a:r>
+              <a:rPr lang="en-US" dirty="0"/>
+              <a:t>For example, </a:t>
+            </a:r>
+          </a:p>
+          <a:p>
+            <a:pPr lvl="1"/>
+            <a:r>
+              <a:rPr lang="en-US" dirty="0"/>
+              <a:t>Is “e” a vowel, yes or no?</a:t>
+            </a:r>
+          </a:p>
+          <a:p>
+            <a:pPr lvl="1"/>
+            <a:r>
+              <a:rPr lang="en-US" dirty="0"/>
+              <a:t>Is “L” a vowel, yes or not?</a:t>
+            </a:r>
+          </a:p>
+          <a:p>
+            <a:r>
+              <a:rPr lang="en-US" dirty="0"/>
+              <a:t>Hint:</a:t>
+            </a:r>
+          </a:p>
+          <a:p>
+            <a:pPr lvl="1"/>
+            <a:r>
+              <a:rPr lang="en-US" dirty="0"/>
+              <a:t>You can store </a:t>
+            </a:r>
+            <a:r>
+              <a:rPr lang="en-US" dirty="0" err="1"/>
+              <a:t>AEIOUaeiou</a:t>
+            </a:r>
+            <a:r>
+              <a:rPr lang="en-US" dirty="0"/>
+              <a:t> in a variable</a:t>
+            </a:r>
+          </a:p>
+          <a:p>
+            <a:pPr lvl="1"/>
+            <a:r>
+              <a:rPr lang="en-US" dirty="0"/>
+              <a:t>You will call contains on the variable, passing in the single letter as the parameter. </a:t>
+            </a:r>
+          </a:p>
+          <a:p>
+            <a:pPr lvl="1"/>
+            <a:r>
+              <a:rPr lang="en-US" dirty="0">
+                <a:latin typeface="Consolas" panose="020B0609020204030204" pitchFamily="49" charset="0"/>
+              </a:rPr>
+              <a:t>public static final String VOWELS = “</a:t>
+            </a:r>
+            <a:r>
+              <a:rPr lang="en-US" dirty="0" err="1">
+                <a:latin typeface="Consolas" panose="020B0609020204030204" pitchFamily="49" charset="0"/>
+              </a:rPr>
+              <a:t>AEIOUaeiou</a:t>
+            </a:r>
+            <a:r>
+              <a:rPr lang="en-US" dirty="0">
+                <a:latin typeface="Consolas" panose="020B0609020204030204" pitchFamily="49" charset="0"/>
+              </a:rPr>
+              <a:t>”;</a:t>
+            </a:r>
+          </a:p>
+        </p:txBody>
+      </p:sp>
+    </p:spTree>
+    <p:extLst>
+      <p:ext uri="{BB962C8B-B14F-4D97-AF65-F5344CB8AC3E}">
+        <p14:creationId xmlns:p14="http://schemas.microsoft.com/office/powerpoint/2010/main" val="2829367216"/>
+      </p:ext>
+    </p:extLst>
+  </p:cSld>
+  <p:clrMapOvr>
+    <a:masterClrMapping/>
+  </p:clrMapOvr>
+  <mc:AlternateContent xmlns:mc="http://schemas.openxmlformats.org/markup-compatibility/2006" xmlns:p14="http://schemas.microsoft.com/office/powerpoint/2010/main">
+    <mc:Choice Requires="p14">
+      <p:transition p14:dur="300">
+        <p:fade/>
+      </p:transition>
+    </mc:Choice>
+    <mc:Fallback xmlns="">
+      <p:transition>
+        <p:fade/>
+      </p:transition>
+    </mc:Fallback>
+  </mc:AlternateContent>
+</p:sld>
+</file>
+
+<file path=ppt/slides/slide6.xml><?xml version="1.0" encoding="utf-8"?>
 <p:sld xmlns:a="http://schemas.openxmlformats.org/drawingml/2006/main" xmlns:r="http://schemas.openxmlformats.org/officeDocument/2006/relationships" xmlns:p="http://schemas.openxmlformats.org/presentationml/2006/main">
   <p:cSld>
     <p:spTree>
@@ -8664,7 +10114,238 @@
 </p:sld>
 </file>
 
-<file path=ppt/slides/slide4.xml><?xml version="1.0" encoding="utf-8"?>
+<file path=ppt/slides/slide7.xml><?xml version="1.0" encoding="utf-8"?>
+<p:sld xmlns:a="http://schemas.openxmlformats.org/drawingml/2006/main" xmlns:r="http://schemas.openxmlformats.org/officeDocument/2006/relationships" xmlns:p="http://schemas.openxmlformats.org/presentationml/2006/main">
+  <p:cSld>
+    <p:spTree>
+      <p:nvGrpSpPr>
+        <p:cNvPr id="1" name=""/>
+        <p:cNvGrpSpPr/>
+        <p:nvPr/>
+      </p:nvGrpSpPr>
+      <p:grpSpPr>
+        <a:xfrm>
+          <a:off x="0" y="0"/>
+          <a:ext cx="0" cy="0"/>
+          <a:chOff x="0" y="0"/>
+          <a:chExt cx="0" cy="0"/>
+        </a:xfrm>
+      </p:grpSpPr>
+      <p:sp>
+        <p:nvSpPr>
+          <p:cNvPr id="2" name="Title 1">
+            <a:extLst>
+              <a:ext uri="{FF2B5EF4-FFF2-40B4-BE49-F238E27FC236}">
+                <a16:creationId xmlns:a16="http://schemas.microsoft.com/office/drawing/2014/main" id="{057F11B6-4DB8-4A48-8FA3-BCA254088F92}"/>
+              </a:ext>
+            </a:extLst>
+          </p:cNvPr>
+          <p:cNvSpPr>
+            <a:spLocks noGrp="1"/>
+          </p:cNvSpPr>
+          <p:nvPr>
+            <p:ph type="title"/>
+          </p:nvPr>
+        </p:nvSpPr>
+        <p:spPr/>
+        <p:txBody>
+          <a:bodyPr/>
+          <a:lstStyle/>
+          <a:p>
+            <a:r>
+              <a:rPr lang="en-US" dirty="0"/>
+              <a:t>Practice 2</a:t>
+            </a:r>
+          </a:p>
+        </p:txBody>
+      </p:sp>
+      <p:sp>
+        <p:nvSpPr>
+          <p:cNvPr id="3" name="Text Placeholder 2">
+            <a:extLst>
+              <a:ext uri="{FF2B5EF4-FFF2-40B4-BE49-F238E27FC236}">
+                <a16:creationId xmlns:a16="http://schemas.microsoft.com/office/drawing/2014/main" id="{CE98442C-67ED-4337-9DEB-783FF7AD4CB6}"/>
+              </a:ext>
+            </a:extLst>
+          </p:cNvPr>
+          <p:cNvSpPr>
+            <a:spLocks noGrp="1"/>
+          </p:cNvSpPr>
+          <p:nvPr>
+            <p:ph type="body" sz="quarter" idx="10"/>
+          </p:nvPr>
+        </p:nvSpPr>
+        <p:spPr>
+          <a:xfrm>
+            <a:off x="628075" y="1776683"/>
+            <a:ext cx="12561453" cy="4877297"/>
+          </a:xfrm>
+        </p:spPr>
+        <p:txBody>
+          <a:bodyPr/>
+          <a:lstStyle/>
+          <a:p>
+            <a:r>
+              <a:rPr lang="en-US" dirty="0"/>
+              <a:t>Write a method that:</a:t>
+            </a:r>
+          </a:p>
+          <a:p>
+            <a:pPr lvl="1"/>
+            <a:r>
+              <a:rPr lang="en-US" dirty="0"/>
+              <a:t>(1) Goes through every character in a String</a:t>
+            </a:r>
+          </a:p>
+          <a:p>
+            <a:pPr lvl="1"/>
+            <a:r>
+              <a:rPr lang="en-US" dirty="0"/>
+              <a:t>(2) If the String has five white spaces, </a:t>
+            </a:r>
+            <a:r>
+              <a:rPr lang="en-US" b="1" dirty="0"/>
+              <a:t>and</a:t>
+            </a:r>
+            <a:r>
+              <a:rPr lang="en-US" dirty="0"/>
+              <a:t> the String length() is divisible by 5 (hint – modulo)  </a:t>
+            </a:r>
+          </a:p>
+          <a:p>
+            <a:pPr lvl="2"/>
+            <a:r>
+              <a:rPr lang="en-US" dirty="0"/>
+              <a:t>Return a String made up of characters from the *after* the spaces! (this is the harder one)</a:t>
+            </a:r>
+          </a:p>
+          <a:p>
+            <a:pPr lvl="2"/>
+            <a:r>
+              <a:rPr lang="en-US" dirty="0"/>
+              <a:t>Example:</a:t>
+            </a:r>
+          </a:p>
+          <a:p>
+            <a:pPr lvl="3"/>
+            <a:r>
+              <a:rPr lang="en-US" dirty="0"/>
+              <a:t>The Quick Brown Fox Jumped Up!</a:t>
+            </a:r>
+          </a:p>
+          <a:p>
+            <a:pPr lvl="3"/>
+            <a:r>
+              <a:rPr lang="en-US" dirty="0"/>
+              <a:t>Returns – QBFJ</a:t>
+            </a:r>
+          </a:p>
+          <a:p>
+            <a:pPr lvl="2"/>
+            <a:r>
+              <a:rPr lang="en-US" dirty="0"/>
+              <a:t>Hint – I would always build the second strength, whether you return it or not – the if condition is probably *after* the loop.</a:t>
+            </a:r>
+          </a:p>
+          <a:p>
+            <a:pPr lvl="2"/>
+            <a:r>
+              <a:rPr lang="en-US" dirty="0"/>
+              <a:t>Hint: </a:t>
+            </a:r>
+            <a:r>
+              <a:rPr lang="en-US" dirty="0" err="1"/>
+              <a:t>Character.isWhitespace</a:t>
+            </a:r>
+            <a:r>
+              <a:rPr lang="en-US" dirty="0"/>
+              <a:t>(char) will be helpful</a:t>
+            </a:r>
+          </a:p>
+          <a:p>
+            <a:pPr lvl="2"/>
+            <a:r>
+              <a:rPr lang="en-US" dirty="0"/>
+              <a:t>Hint: First loop through the String like last Friday, then build from there</a:t>
+            </a:r>
+          </a:p>
+          <a:p>
+            <a:pPr lvl="1"/>
+            <a:r>
+              <a:rPr lang="en-US" dirty="0"/>
+              <a:t>(3) Else </a:t>
+            </a:r>
+          </a:p>
+          <a:p>
+            <a:pPr lvl="2"/>
+            <a:r>
+              <a:rPr lang="en-US" dirty="0"/>
+              <a:t>Return the String as is. </a:t>
+            </a:r>
+          </a:p>
+        </p:txBody>
+      </p:sp>
+      <p:sp>
+        <p:nvSpPr>
+          <p:cNvPr id="4" name="TextBox 3">
+            <a:extLst>
+              <a:ext uri="{FF2B5EF4-FFF2-40B4-BE49-F238E27FC236}">
+                <a16:creationId xmlns:a16="http://schemas.microsoft.com/office/drawing/2014/main" id="{12B8EAED-1A2F-400D-B026-6D8EC2EBA3F1}"/>
+              </a:ext>
+            </a:extLst>
+          </p:cNvPr>
+          <p:cNvSpPr txBox="1"/>
+          <p:nvPr/>
+        </p:nvSpPr>
+        <p:spPr>
+          <a:xfrm>
+            <a:off x="8897257" y="6616455"/>
+            <a:ext cx="4920343" cy="707886"/>
+          </a:xfrm>
+          <a:prstGeom prst="rect">
+            <a:avLst/>
+          </a:prstGeom>
+          <a:noFill/>
+        </p:spPr>
+        <p:txBody>
+          <a:bodyPr wrap="square" rtlCol="0">
+            <a:spAutoFit/>
+          </a:bodyPr>
+          <a:lstStyle/>
+          <a:p>
+            <a:r>
+              <a:rPr lang="en-US" dirty="0"/>
+              <a:t>Yes, this example is meant to help you with P2 and the Lossy Encoding!</a:t>
+            </a:r>
+          </a:p>
+        </p:txBody>
+      </p:sp>
+    </p:spTree>
+    <p:extLst>
+      <p:ext uri="{BB962C8B-B14F-4D97-AF65-F5344CB8AC3E}">
+        <p14:creationId xmlns:p14="http://schemas.microsoft.com/office/powerpoint/2010/main" val="2914253160"/>
+      </p:ext>
+    </p:extLst>
+  </p:cSld>
+  <p:clrMapOvr>
+    <a:masterClrMapping/>
+  </p:clrMapOvr>
+  <mc:AlternateContent xmlns:mc="http://schemas.openxmlformats.org/markup-compatibility/2006" xmlns:p14="http://schemas.microsoft.com/office/powerpoint/2010/main">
+    <mc:Choice Requires="p14">
+      <p:transition p14:dur="300">
+        <p:fade/>
+      </p:transition>
+    </mc:Choice>
+    <mc:Fallback xmlns="">
+      <p:transition>
+        <p:fade/>
+      </p:transition>
+    </mc:Fallback>
+  </mc:AlternateContent>
+</p:sld>
+</file>
+
+<file path=ppt/slides/slide8.xml><?xml version="1.0" encoding="utf-8"?>
 <p:sld xmlns:a="http://schemas.openxmlformats.org/drawingml/2006/main" xmlns:r="http://schemas.openxmlformats.org/officeDocument/2006/relationships" xmlns:p="http://schemas.openxmlformats.org/presentationml/2006/main">
   <p:cSld>
     <p:spTree>
@@ -8795,6 +10476,228 @@
     <p:extLst>
       <p:ext uri="{BB962C8B-B14F-4D97-AF65-F5344CB8AC3E}">
         <p14:creationId xmlns:p14="http://schemas.microsoft.com/office/powerpoint/2010/main" val="3232848320"/>
+      </p:ext>
+    </p:extLst>
+  </p:cSld>
+  <p:clrMapOvr>
+    <a:masterClrMapping/>
+  </p:clrMapOvr>
+  <mc:AlternateContent xmlns:mc="http://schemas.openxmlformats.org/markup-compatibility/2006" xmlns:p14="http://schemas.microsoft.com/office/powerpoint/2010/main">
+    <mc:Choice Requires="p14">
+      <p:transition p14:dur="300">
+        <p:fade/>
+      </p:transition>
+    </mc:Choice>
+    <mc:Fallback xmlns="">
+      <p:transition>
+        <p:fade/>
+      </p:transition>
+    </mc:Fallback>
+  </mc:AlternateContent>
+</p:sld>
+</file>
+
+<file path=ppt/slides/slide9.xml><?xml version="1.0" encoding="utf-8"?>
+<p:sld xmlns:a="http://schemas.openxmlformats.org/drawingml/2006/main" xmlns:r="http://schemas.openxmlformats.org/officeDocument/2006/relationships" xmlns:p="http://schemas.openxmlformats.org/presentationml/2006/main">
+  <p:cSld>
+    <p:spTree>
+      <p:nvGrpSpPr>
+        <p:cNvPr id="1" name=""/>
+        <p:cNvGrpSpPr/>
+        <p:nvPr/>
+      </p:nvGrpSpPr>
+      <p:grpSpPr>
+        <a:xfrm>
+          <a:off x="0" y="0"/>
+          <a:ext cx="0" cy="0"/>
+          <a:chOff x="0" y="0"/>
+          <a:chExt cx="0" cy="0"/>
+        </a:xfrm>
+      </p:grpSpPr>
+      <p:sp>
+        <p:nvSpPr>
+          <p:cNvPr id="2" name="Title 1">
+            <a:extLst>
+              <a:ext uri="{FF2B5EF4-FFF2-40B4-BE49-F238E27FC236}">
+                <a16:creationId xmlns:a16="http://schemas.microsoft.com/office/drawing/2014/main" id="{8105BDF9-F9DA-ED4C-86D3-9EF359A82435}"/>
+              </a:ext>
+            </a:extLst>
+          </p:cNvPr>
+          <p:cNvSpPr>
+            <a:spLocks noGrp="1"/>
+          </p:cNvSpPr>
+          <p:nvPr>
+            <p:ph type="title"/>
+          </p:nvPr>
+        </p:nvSpPr>
+        <p:spPr/>
+        <p:txBody>
+          <a:bodyPr/>
+          <a:lstStyle/>
+          <a:p>
+            <a:r>
+              <a:rPr lang="en-US" dirty="0"/>
+              <a:t>Pair Programming</a:t>
+            </a:r>
+          </a:p>
+        </p:txBody>
+      </p:sp>
+      <p:sp>
+        <p:nvSpPr>
+          <p:cNvPr id="3" name="Text Placeholder 2">
+            <a:extLst>
+              <a:ext uri="{FF2B5EF4-FFF2-40B4-BE49-F238E27FC236}">
+                <a16:creationId xmlns:a16="http://schemas.microsoft.com/office/drawing/2014/main" id="{0B6D0490-2BCC-874D-BED8-E6C939A4E511}"/>
+              </a:ext>
+            </a:extLst>
+          </p:cNvPr>
+          <p:cNvSpPr>
+            <a:spLocks noGrp="1"/>
+          </p:cNvSpPr>
+          <p:nvPr>
+            <p:ph type="body" sz="quarter" idx="10"/>
+          </p:nvPr>
+        </p:nvSpPr>
+        <p:spPr>
+          <a:xfrm>
+            <a:off x="628075" y="1464768"/>
+            <a:ext cx="12561453" cy="3731534"/>
+          </a:xfrm>
+        </p:spPr>
+        <p:txBody>
+          <a:bodyPr/>
+          <a:lstStyle/>
+          <a:p>
+            <a:r>
+              <a:rPr lang="en-US" dirty="0"/>
+              <a:t>Build a class to represent a Person which has a name and a birthday. The birthday should be stored in three different variables: year, month, and day of birth.</a:t>
+            </a:r>
+          </a:p>
+          <a:p>
+            <a:r>
+              <a:rPr lang="en-US" dirty="0"/>
+              <a:t>The Person class needs to make sure that the year, month and day of birth are </a:t>
+            </a:r>
+            <a:r>
+              <a:rPr lang="en-US" b="1" dirty="0"/>
+              <a:t>valid</a:t>
+            </a:r>
+            <a:r>
+              <a:rPr lang="en-US" dirty="0"/>
+              <a:t>. </a:t>
+            </a:r>
+          </a:p>
+          <a:p>
+            <a:r>
+              <a:rPr lang="en-US" dirty="0"/>
+              <a:t>The Person class also needs to provide information if a person was born in a leap year or not.</a:t>
+            </a:r>
+          </a:p>
+          <a:p>
+            <a:r>
+              <a:rPr lang="en-US" dirty="0"/>
+              <a:t>Also build a </a:t>
+            </a:r>
+            <a:r>
+              <a:rPr lang="en-US" dirty="0" err="1"/>
+              <a:t>ApplicationPerson</a:t>
+            </a:r>
+            <a:r>
+              <a:rPr lang="en-US" dirty="0"/>
+              <a:t> class that has a main method</a:t>
+            </a:r>
+          </a:p>
+          <a:p>
+            <a:pPr marL="0" indent="0">
+              <a:buNone/>
+            </a:pPr>
+            <a:r>
+              <a:rPr lang="en-US" dirty="0"/>
+              <a:t>        which creates a person, prints that person information, and prints</a:t>
+            </a:r>
+          </a:p>
+          <a:p>
+            <a:pPr marL="0" indent="0">
+              <a:buNone/>
+            </a:pPr>
+            <a:r>
+              <a:rPr lang="en-US" dirty="0"/>
+              <a:t>        if that person was born in a leap year or not.</a:t>
+            </a:r>
+          </a:p>
+          <a:p>
+            <a:endParaRPr lang="en-US" dirty="0"/>
+          </a:p>
+        </p:txBody>
+      </p:sp>
+      <p:pic>
+        <p:nvPicPr>
+          <p:cNvPr id="4" name="Picture 3">
+            <a:extLst>
+              <a:ext uri="{FF2B5EF4-FFF2-40B4-BE49-F238E27FC236}">
+                <a16:creationId xmlns:a16="http://schemas.microsoft.com/office/drawing/2014/main" id="{4AE79AD4-4D90-4E96-AEFD-AC0F45D851F7}"/>
+              </a:ext>
+            </a:extLst>
+          </p:cNvPr>
+          <p:cNvPicPr>
+            <a:picLocks noChangeAspect="1"/>
+          </p:cNvPicPr>
+          <p:nvPr/>
+        </p:nvPicPr>
+        <p:blipFill>
+          <a:blip r:embed="rId2"/>
+          <a:stretch>
+            <a:fillRect/>
+          </a:stretch>
+        </p:blipFill>
+        <p:spPr>
+          <a:xfrm>
+            <a:off x="8250865" y="3308088"/>
+            <a:ext cx="5197844" cy="3596540"/>
+          </a:xfrm>
+          <a:prstGeom prst="rect">
+            <a:avLst/>
+          </a:prstGeom>
+        </p:spPr>
+      </p:pic>
+      <p:sp>
+        <p:nvSpPr>
+          <p:cNvPr id="5" name="Rectangle 4">
+            <a:extLst>
+              <a:ext uri="{FF2B5EF4-FFF2-40B4-BE49-F238E27FC236}">
+                <a16:creationId xmlns:a16="http://schemas.microsoft.com/office/drawing/2014/main" id="{7434C3AE-57E5-4BE9-B861-704381825A0E}"/>
+              </a:ext>
+            </a:extLst>
+          </p:cNvPr>
+          <p:cNvSpPr/>
+          <p:nvPr/>
+        </p:nvSpPr>
+        <p:spPr>
+          <a:xfrm>
+            <a:off x="7292754" y="7052559"/>
+            <a:ext cx="6908800" cy="307777"/>
+          </a:xfrm>
+          <a:prstGeom prst="rect">
+            <a:avLst/>
+          </a:prstGeom>
+        </p:spPr>
+        <p:txBody>
+          <a:bodyPr>
+            <a:spAutoFit/>
+          </a:bodyPr>
+          <a:lstStyle/>
+          <a:p>
+            <a:r>
+              <a:rPr lang="en-US" sz="1400" dirty="0"/>
+              <a:t>https://docs.microsoft.com/en-us/office/troubleshoot/excel/determine-a-leap-year</a:t>
+            </a:r>
+          </a:p>
+        </p:txBody>
+      </p:sp>
+    </p:spTree>
+    <p:extLst>
+      <p:ext uri="{BB962C8B-B14F-4D97-AF65-F5344CB8AC3E}">
+        <p14:creationId xmlns:p14="http://schemas.microsoft.com/office/powerpoint/2010/main" val="127812246"/>
       </p:ext>
     </p:extLst>
   </p:cSld>

</xml_diff>

<commit_message>
Grammar/typo fixes and slight reorder
</commit_message>
<xml_diff>
--- a/slides/On-Campus/06_01_LogicalOperators.pptx
+++ b/slides/On-Campus/06_01_LogicalOperators.pptx
@@ -13,9 +13,9 @@
   <p:sldIdLst>
     <p:sldId id="256" r:id="rId2"/>
     <p:sldId id="266" r:id="rId3"/>
-    <p:sldId id="260" r:id="rId4"/>
-    <p:sldId id="257" r:id="rId5"/>
-    <p:sldId id="268" r:id="rId6"/>
+    <p:sldId id="257" r:id="rId4"/>
+    <p:sldId id="268" r:id="rId5"/>
+    <p:sldId id="260" r:id="rId6"/>
     <p:sldId id="258" r:id="rId7"/>
     <p:sldId id="267" r:id="rId8"/>
     <p:sldId id="259" r:id="rId9"/>
@@ -222,7 +222,7 @@
           <a:p>
             <a:fld id="{4D7E51A5-B478-1E40-8CBB-0DAA8831E99D}" type="datetimeFigureOut">
               <a:rPr lang="en-US" smtClean="0"/>
-              <a:t>9/26/2021</a:t>
+              <a:t>9/27/21</a:t>
             </a:fld>
             <a:endParaRPr lang="en-US"/>
           </a:p>
@@ -447,7 +447,7 @@
           <a:p>
             <a:fld id="{D0ED587F-861E-6740-9643-E3DDAE89B8D6}" type="datetimeFigureOut">
               <a:rPr lang="en-US" smtClean="0"/>
-              <a:t>9/26/2021</a:t>
+              <a:t>9/27/21</a:t>
             </a:fld>
             <a:endParaRPr lang="en-US"/>
           </a:p>
@@ -7676,311 +7676,6 @@
       </p:grpSpPr>
       <p:sp>
         <p:nvSpPr>
-          <p:cNvPr id="2" name="Title 1">
-            <a:extLst>
-              <a:ext uri="{FF2B5EF4-FFF2-40B4-BE49-F238E27FC236}">
-                <a16:creationId xmlns:a16="http://schemas.microsoft.com/office/drawing/2014/main" id="{8105BDF9-F9DA-ED4C-86D3-9EF359A82435}"/>
-              </a:ext>
-            </a:extLst>
-          </p:cNvPr>
-          <p:cNvSpPr>
-            <a:spLocks noGrp="1"/>
-          </p:cNvSpPr>
-          <p:nvPr>
-            <p:ph type="title"/>
-          </p:nvPr>
-        </p:nvSpPr>
-        <p:spPr/>
-        <p:txBody>
-          <a:bodyPr/>
-          <a:lstStyle/>
-          <a:p>
-            <a:r>
-              <a:rPr lang="en-US" dirty="0"/>
-              <a:t>Reading Check – Logical Operators</a:t>
-            </a:r>
-          </a:p>
-        </p:txBody>
-      </p:sp>
-      <p:sp>
-        <p:nvSpPr>
-          <p:cNvPr id="3" name="Text Placeholder 2">
-            <a:extLst>
-              <a:ext uri="{FF2B5EF4-FFF2-40B4-BE49-F238E27FC236}">
-                <a16:creationId xmlns:a16="http://schemas.microsoft.com/office/drawing/2014/main" id="{0B6D0490-2BCC-874D-BED8-E6C939A4E511}"/>
-              </a:ext>
-            </a:extLst>
-          </p:cNvPr>
-          <p:cNvSpPr>
-            <a:spLocks noGrp="1"/>
-          </p:cNvSpPr>
-          <p:nvPr>
-            <p:ph type="body" sz="quarter" idx="10"/>
-          </p:nvPr>
-        </p:nvSpPr>
-        <p:spPr>
-          <a:xfrm>
-            <a:off x="628075" y="1776683"/>
-            <a:ext cx="12561453" cy="4888774"/>
-          </a:xfrm>
-        </p:spPr>
-        <p:txBody>
-          <a:bodyPr vert="horz" lIns="91440" tIns="91440" rIns="91440" bIns="91440" rtlCol="0" anchor="t">
-            <a:spAutoFit/>
-          </a:bodyPr>
-          <a:lstStyle/>
-          <a:p>
-            <a:pPr marL="524510" indent="-524510"/>
-            <a:r>
-              <a:rPr lang="en-US" dirty="0"/>
-              <a:t>Consider the table below:</a:t>
-            </a:r>
-            <a:endParaRPr lang="en-US"/>
-          </a:p>
-          <a:p>
-            <a:pPr marL="524510" indent="-524510"/>
-            <a:endParaRPr lang="en-US" dirty="0"/>
-          </a:p>
-          <a:p>
-            <a:pPr marL="699135" lvl="1" indent="0">
-              <a:buNone/>
-            </a:pPr>
-            <a:endParaRPr lang="en-US" dirty="0"/>
-          </a:p>
-          <a:p>
-            <a:pPr marL="699135" lvl="1" indent="0">
-              <a:buNone/>
-            </a:pPr>
-            <a:endParaRPr lang="en-US" dirty="0"/>
-          </a:p>
-          <a:p>
-            <a:pPr marL="699135" lvl="1" indent="0">
-              <a:buNone/>
-            </a:pPr>
-            <a:endParaRPr lang="en-US" dirty="0"/>
-          </a:p>
-          <a:p>
-            <a:pPr marL="699135" lvl="1" indent="0">
-              <a:buNone/>
-            </a:pPr>
-            <a:endParaRPr lang="en-US" dirty="0"/>
-          </a:p>
-          <a:p>
-            <a:pPr marL="524510" indent="-524510"/>
-            <a:endParaRPr lang="en-US" dirty="0"/>
-          </a:p>
-          <a:p>
-            <a:pPr marL="524510" indent="-524510"/>
-            <a:r>
-              <a:rPr lang="en-US" dirty="0"/>
-              <a:t>Which logical operator is ?:</a:t>
-            </a:r>
-          </a:p>
-          <a:p>
-            <a:pPr marL="342900" indent="-342900">
-              <a:buAutoNum type="alphaUcPeriod"/>
-            </a:pPr>
-            <a:r>
-              <a:rPr lang="en-US" dirty="0"/>
-              <a:t>AND (&amp;&amp;)</a:t>
-            </a:r>
-          </a:p>
-          <a:p>
-            <a:pPr marL="342900" indent="-342900">
-              <a:buAutoNum type="alphaUcPeriod"/>
-            </a:pPr>
-            <a:r>
-              <a:rPr lang="en-US" dirty="0"/>
-              <a:t>OR (||)</a:t>
-            </a:r>
-          </a:p>
-          <a:p>
-            <a:pPr marL="342900" indent="-342900">
-              <a:buAutoNum type="alphaUcPeriod"/>
-            </a:pPr>
-            <a:r>
-              <a:rPr lang="en-US" dirty="0"/>
-              <a:t>NOT (!)</a:t>
-            </a:r>
-          </a:p>
-        </p:txBody>
-      </p:sp>
-      <p:pic>
-        <p:nvPicPr>
-          <p:cNvPr id="4" name="Picture 3">
-            <a:extLst>
-              <a:ext uri="{FF2B5EF4-FFF2-40B4-BE49-F238E27FC236}">
-                <a16:creationId xmlns:a16="http://schemas.microsoft.com/office/drawing/2014/main" id="{417B400A-D2D4-430A-AC34-82DA7951B365}"/>
-              </a:ext>
-            </a:extLst>
-          </p:cNvPr>
-          <p:cNvPicPr>
-            <a:picLocks noChangeAspect="1"/>
-          </p:cNvPicPr>
-          <p:nvPr/>
-        </p:nvPicPr>
-        <p:blipFill>
-          <a:blip r:embed="rId2"/>
-          <a:stretch>
-            <a:fillRect/>
-          </a:stretch>
-        </p:blipFill>
-        <p:spPr>
-          <a:xfrm>
-            <a:off x="1135209" y="2412930"/>
-            <a:ext cx="3381375" cy="1933575"/>
-          </a:xfrm>
-          <a:prstGeom prst="rect">
-            <a:avLst/>
-          </a:prstGeom>
-        </p:spPr>
-      </p:pic>
-      <mc:AlternateContent xmlns:mc="http://schemas.openxmlformats.org/markup-compatibility/2006">
-        <mc:Choice xmlns:p14="http://schemas.microsoft.com/office/powerpoint/2010/main" Requires="p14">
-          <p:contentPart p14:bwMode="auto" r:id="rId3">
-            <p14:nvContentPartPr>
-              <p14:cNvPr id="8" name="Ink 7">
-                <a:extLst>
-                  <a:ext uri="{FF2B5EF4-FFF2-40B4-BE49-F238E27FC236}">
-                    <a16:creationId xmlns:a16="http://schemas.microsoft.com/office/drawing/2014/main" id="{DA9F3E6B-39A5-4581-940B-C91546280994}"/>
-                  </a:ext>
-                </a:extLst>
-              </p14:cNvPr>
-              <p14:cNvContentPartPr/>
-              <p14:nvPr/>
-            </p14:nvContentPartPr>
-            <p14:xfrm>
-              <a:off x="3394989" y="2579337"/>
-              <a:ext cx="199440" cy="124200"/>
-            </p14:xfrm>
-          </p:contentPart>
-        </mc:Choice>
-        <mc:Fallback>
-          <p:pic>
-            <p:nvPicPr>
-              <p:cNvPr id="8" name="Ink 7">
-                <a:extLst>
-                  <a:ext uri="{FF2B5EF4-FFF2-40B4-BE49-F238E27FC236}">
-                    <a16:creationId xmlns:a16="http://schemas.microsoft.com/office/drawing/2014/main" id="{DA9F3E6B-39A5-4581-940B-C91546280994}"/>
-                  </a:ext>
-                </a:extLst>
-              </p:cNvPr>
-              <p:cNvPicPr/>
-              <p:nvPr/>
-            </p:nvPicPr>
-            <p:blipFill>
-              <a:blip r:embed="rId4"/>
-              <a:stretch>
-                <a:fillRect/>
-              </a:stretch>
-            </p:blipFill>
-            <p:spPr>
-              <a:xfrm>
-                <a:off x="3340989" y="2471697"/>
-                <a:ext cx="307080" cy="339840"/>
-              </a:xfrm>
-              <a:prstGeom prst="rect">
-                <a:avLst/>
-              </a:prstGeom>
-            </p:spPr>
-          </p:pic>
-        </mc:Fallback>
-      </mc:AlternateContent>
-      <mc:AlternateContent xmlns:mc="http://schemas.openxmlformats.org/markup-compatibility/2006">
-        <mc:Choice xmlns:p14="http://schemas.microsoft.com/office/powerpoint/2010/main" Requires="p14">
-          <p:contentPart p14:bwMode="auto" r:id="rId5">
-            <p14:nvContentPartPr>
-              <p14:cNvPr id="12" name="Ink 11">
-                <a:extLst>
-                  <a:ext uri="{FF2B5EF4-FFF2-40B4-BE49-F238E27FC236}">
-                    <a16:creationId xmlns:a16="http://schemas.microsoft.com/office/drawing/2014/main" id="{C9EAD53D-80EC-4C60-9E38-F442A4A1B33C}"/>
-                  </a:ext>
-                </a:extLst>
-              </p14:cNvPr>
-              <p14:cNvContentPartPr/>
-              <p14:nvPr/>
-            </p14:nvContentPartPr>
-            <p14:xfrm>
-              <a:off x="3759309" y="4844097"/>
-              <a:ext cx="140760" cy="194760"/>
-            </p14:xfrm>
-          </p:contentPart>
-        </mc:Choice>
-        <mc:Fallback>
-          <p:pic>
-            <p:nvPicPr>
-              <p:cNvPr id="12" name="Ink 11">
-                <a:extLst>
-                  <a:ext uri="{FF2B5EF4-FFF2-40B4-BE49-F238E27FC236}">
-                    <a16:creationId xmlns:a16="http://schemas.microsoft.com/office/drawing/2014/main" id="{C9EAD53D-80EC-4C60-9E38-F442A4A1B33C}"/>
-                  </a:ext>
-                </a:extLst>
-              </p:cNvPr>
-              <p:cNvPicPr/>
-              <p:nvPr/>
-            </p:nvPicPr>
-            <p:blipFill>
-              <a:blip r:embed="rId6"/>
-              <a:stretch>
-                <a:fillRect/>
-              </a:stretch>
-            </p:blipFill>
-            <p:spPr>
-              <a:xfrm>
-                <a:off x="3705669" y="4736097"/>
-                <a:ext cx="248400" cy="410400"/>
-              </a:xfrm>
-              <a:prstGeom prst="rect">
-                <a:avLst/>
-              </a:prstGeom>
-            </p:spPr>
-          </p:pic>
-        </mc:Fallback>
-      </mc:AlternateContent>
-    </p:spTree>
-    <p:extLst>
-      <p:ext uri="{BB962C8B-B14F-4D97-AF65-F5344CB8AC3E}">
-        <p14:creationId xmlns:p14="http://schemas.microsoft.com/office/powerpoint/2010/main" val="3399856286"/>
-      </p:ext>
-    </p:extLst>
-  </p:cSld>
-  <p:clrMapOvr>
-    <a:masterClrMapping/>
-  </p:clrMapOvr>
-  <mc:AlternateContent xmlns:mc="http://schemas.openxmlformats.org/markup-compatibility/2006" xmlns:p14="http://schemas.microsoft.com/office/powerpoint/2010/main">
-    <mc:Choice Requires="p14">
-      <p:transition p14:dur="300">
-        <p:fade/>
-      </p:transition>
-    </mc:Choice>
-    <mc:Fallback xmlns="">
-      <p:transition>
-        <p:fade/>
-      </p:transition>
-    </mc:Fallback>
-  </mc:AlternateContent>
-</p:sld>
-</file>
-
-<file path=ppt/slides/slide4.xml><?xml version="1.0" encoding="utf-8"?>
-<p:sld xmlns:a="http://schemas.openxmlformats.org/drawingml/2006/main" xmlns:r="http://schemas.openxmlformats.org/officeDocument/2006/relationships" xmlns:p="http://schemas.openxmlformats.org/presentationml/2006/main">
-  <p:cSld>
-    <p:spTree>
-      <p:nvGrpSpPr>
-        <p:cNvPr id="1" name=""/>
-        <p:cNvGrpSpPr/>
-        <p:nvPr/>
-      </p:nvGrpSpPr>
-      <p:grpSpPr>
-        <a:xfrm>
-          <a:off x="0" y="0"/>
-          <a:ext cx="0" cy="0"/>
-          <a:chOff x="0" y="0"/>
-          <a:chExt cx="0" cy="0"/>
-        </a:xfrm>
-      </p:grpSpPr>
-      <p:sp>
-        <p:nvSpPr>
           <p:cNvPr id="4" name="Title 3">
             <a:extLst>
               <a:ext uri="{FF2B5EF4-FFF2-40B4-BE49-F238E27FC236}">
@@ -8002,7 +7697,7 @@
           <a:p>
             <a:r>
               <a:rPr lang="en-US" dirty="0"/>
-              <a:t>Review – Conditional Operators</a:t>
+              <a:t>Review – Conditional Operators - Primitives</a:t>
             </a:r>
           </a:p>
         </p:txBody>
@@ -8808,7 +8503,7 @@
 </p:sld>
 </file>
 
-<file path=ppt/slides/slide5.xml><?xml version="1.0" encoding="utf-8"?>
+<file path=ppt/slides/slide4.xml><?xml version="1.0" encoding="utf-8"?>
 <p:sld xmlns:a="http://schemas.openxmlformats.org/drawingml/2006/main" xmlns:r="http://schemas.openxmlformats.org/officeDocument/2006/relationships" xmlns:p="http://schemas.openxmlformats.org/presentationml/2006/main">
   <p:cSld>
     <p:spTree>
@@ -8923,7 +8618,7 @@
             <a:pPr lvl="1"/>
             <a:r>
               <a:rPr lang="en-US" dirty="0"/>
-              <a:t>Is “L” a vowel, yes or not?</a:t>
+              <a:t>Is “L” a vowel, yes or no?</a:t>
             </a:r>
           </a:p>
           <a:p>
@@ -8951,7 +8646,15 @@
             <a:pPr lvl="1"/>
             <a:r>
               <a:rPr lang="en-US" dirty="0"/>
-              <a:t>You will call contains on the variable, passing in the single letter as the parameter. </a:t>
+              <a:t>You will call </a:t>
+            </a:r>
+            <a:r>
+              <a:rPr lang="en-US" b="1" dirty="0"/>
+              <a:t>contains</a:t>
+            </a:r>
+            <a:r>
+              <a:rPr lang="en-US" dirty="0"/>
+              <a:t> on the variable, passing in the single letter as the parameter. </a:t>
             </a:r>
           </a:p>
           <a:p>
@@ -8974,6 +8677,68 @@
               </a:rPr>
               <a:t>”;</a:t>
             </a:r>
+          </a:p>
+        </p:txBody>
+      </p:sp>
+      <p:sp>
+        <p:nvSpPr>
+          <p:cNvPr id="4" name="TextBox 3">
+            <a:extLst>
+              <a:ext uri="{FF2B5EF4-FFF2-40B4-BE49-F238E27FC236}">
+                <a16:creationId xmlns:a16="http://schemas.microsoft.com/office/drawing/2014/main" id="{A686A9CD-5237-324C-A2B7-DCCCCC660D9D}"/>
+              </a:ext>
+            </a:extLst>
+          </p:cNvPr>
+          <p:cNvSpPr txBox="1"/>
+          <p:nvPr/>
+        </p:nvSpPr>
+        <p:spPr>
+          <a:xfrm>
+            <a:off x="6231467" y="6175022"/>
+            <a:ext cx="7551061" cy="1015663"/>
+          </a:xfrm>
+          <a:prstGeom prst="rect">
+            <a:avLst/>
+          </a:prstGeom>
+          <a:solidFill>
+            <a:schemeClr val="accent1"/>
+          </a:solidFill>
+        </p:spPr>
+        <p:txBody>
+          <a:bodyPr wrap="square" rtlCol="0">
+            <a:spAutoFit/>
+          </a:bodyPr>
+          <a:lstStyle/>
+          <a:p>
+            <a:r>
+              <a:rPr lang="en-US" b="1" dirty="0"/>
+              <a:t>Comparing Objects:</a:t>
+            </a:r>
+          </a:p>
+          <a:p>
+            <a:r>
+              <a:rPr lang="en-US" dirty="0"/>
+              <a:t>.equals()</a:t>
+            </a:r>
+          </a:p>
+          <a:p>
+            <a:r>
+              <a:rPr lang="en-US" dirty="0"/>
+              <a:t>Strings additional methods: </a:t>
+            </a:r>
+            <a:r>
+              <a:rPr lang="en-US" dirty="0" err="1"/>
+              <a:t>equalsIgnoreCase</a:t>
+            </a:r>
+            <a:r>
+              <a:rPr lang="en-US" dirty="0"/>
+              <a:t>, contains, </a:t>
+            </a:r>
+            <a:r>
+              <a:rPr lang="en-US" dirty="0" err="1"/>
+              <a:t>etc</a:t>
+            </a:r>
+            <a:endParaRPr lang="en-US" dirty="0"/>
           </a:p>
         </p:txBody>
       </p:sp>
@@ -8981,6 +8746,311 @@
     <p:extLst>
       <p:ext uri="{BB962C8B-B14F-4D97-AF65-F5344CB8AC3E}">
         <p14:creationId xmlns:p14="http://schemas.microsoft.com/office/powerpoint/2010/main" val="2829367216"/>
+      </p:ext>
+    </p:extLst>
+  </p:cSld>
+  <p:clrMapOvr>
+    <a:masterClrMapping/>
+  </p:clrMapOvr>
+  <mc:AlternateContent xmlns:mc="http://schemas.openxmlformats.org/markup-compatibility/2006" xmlns:p14="http://schemas.microsoft.com/office/powerpoint/2010/main">
+    <mc:Choice Requires="p14">
+      <p:transition p14:dur="300">
+        <p:fade/>
+      </p:transition>
+    </mc:Choice>
+    <mc:Fallback xmlns="">
+      <p:transition>
+        <p:fade/>
+      </p:transition>
+    </mc:Fallback>
+  </mc:AlternateContent>
+</p:sld>
+</file>
+
+<file path=ppt/slides/slide5.xml><?xml version="1.0" encoding="utf-8"?>
+<p:sld xmlns:a="http://schemas.openxmlformats.org/drawingml/2006/main" xmlns:r="http://schemas.openxmlformats.org/officeDocument/2006/relationships" xmlns:p="http://schemas.openxmlformats.org/presentationml/2006/main">
+  <p:cSld>
+    <p:spTree>
+      <p:nvGrpSpPr>
+        <p:cNvPr id="1" name=""/>
+        <p:cNvGrpSpPr/>
+        <p:nvPr/>
+      </p:nvGrpSpPr>
+      <p:grpSpPr>
+        <a:xfrm>
+          <a:off x="0" y="0"/>
+          <a:ext cx="0" cy="0"/>
+          <a:chOff x="0" y="0"/>
+          <a:chExt cx="0" cy="0"/>
+        </a:xfrm>
+      </p:grpSpPr>
+      <p:sp>
+        <p:nvSpPr>
+          <p:cNvPr id="2" name="Title 1">
+            <a:extLst>
+              <a:ext uri="{FF2B5EF4-FFF2-40B4-BE49-F238E27FC236}">
+                <a16:creationId xmlns:a16="http://schemas.microsoft.com/office/drawing/2014/main" id="{8105BDF9-F9DA-ED4C-86D3-9EF359A82435}"/>
+              </a:ext>
+            </a:extLst>
+          </p:cNvPr>
+          <p:cNvSpPr>
+            <a:spLocks noGrp="1"/>
+          </p:cNvSpPr>
+          <p:nvPr>
+            <p:ph type="title"/>
+          </p:nvPr>
+        </p:nvSpPr>
+        <p:spPr/>
+        <p:txBody>
+          <a:bodyPr/>
+          <a:lstStyle/>
+          <a:p>
+            <a:r>
+              <a:rPr lang="en-US" dirty="0"/>
+              <a:t>Reading Check – Logical Operators</a:t>
+            </a:r>
+          </a:p>
+        </p:txBody>
+      </p:sp>
+      <p:sp>
+        <p:nvSpPr>
+          <p:cNvPr id="3" name="Text Placeholder 2">
+            <a:extLst>
+              <a:ext uri="{FF2B5EF4-FFF2-40B4-BE49-F238E27FC236}">
+                <a16:creationId xmlns:a16="http://schemas.microsoft.com/office/drawing/2014/main" id="{0B6D0490-2BCC-874D-BED8-E6C939A4E511}"/>
+              </a:ext>
+            </a:extLst>
+          </p:cNvPr>
+          <p:cNvSpPr>
+            <a:spLocks noGrp="1"/>
+          </p:cNvSpPr>
+          <p:nvPr>
+            <p:ph type="body" sz="quarter" idx="10"/>
+          </p:nvPr>
+        </p:nvSpPr>
+        <p:spPr>
+          <a:xfrm>
+            <a:off x="628075" y="1776683"/>
+            <a:ext cx="12561453" cy="4888774"/>
+          </a:xfrm>
+        </p:spPr>
+        <p:txBody>
+          <a:bodyPr vert="horz" lIns="91440" tIns="91440" rIns="91440" bIns="91440" rtlCol="0" anchor="t">
+            <a:spAutoFit/>
+          </a:bodyPr>
+          <a:lstStyle/>
+          <a:p>
+            <a:pPr marL="524510" indent="-524510"/>
+            <a:r>
+              <a:rPr lang="en-US" dirty="0"/>
+              <a:t>Consider the table below:</a:t>
+            </a:r>
+            <a:endParaRPr lang="en-US"/>
+          </a:p>
+          <a:p>
+            <a:pPr marL="524510" indent="-524510"/>
+            <a:endParaRPr lang="en-US" dirty="0"/>
+          </a:p>
+          <a:p>
+            <a:pPr marL="699135" lvl="1" indent="0">
+              <a:buNone/>
+            </a:pPr>
+            <a:endParaRPr lang="en-US" dirty="0"/>
+          </a:p>
+          <a:p>
+            <a:pPr marL="699135" lvl="1" indent="0">
+              <a:buNone/>
+            </a:pPr>
+            <a:endParaRPr lang="en-US" dirty="0"/>
+          </a:p>
+          <a:p>
+            <a:pPr marL="699135" lvl="1" indent="0">
+              <a:buNone/>
+            </a:pPr>
+            <a:endParaRPr lang="en-US" dirty="0"/>
+          </a:p>
+          <a:p>
+            <a:pPr marL="699135" lvl="1" indent="0">
+              <a:buNone/>
+            </a:pPr>
+            <a:endParaRPr lang="en-US" dirty="0"/>
+          </a:p>
+          <a:p>
+            <a:pPr marL="524510" indent="-524510"/>
+            <a:endParaRPr lang="en-US" dirty="0"/>
+          </a:p>
+          <a:p>
+            <a:pPr marL="524510" indent="-524510"/>
+            <a:r>
+              <a:rPr lang="en-US" dirty="0"/>
+              <a:t>Which logical operator is ?:</a:t>
+            </a:r>
+          </a:p>
+          <a:p>
+            <a:pPr marL="342900" indent="-342900">
+              <a:buAutoNum type="alphaUcPeriod"/>
+            </a:pPr>
+            <a:r>
+              <a:rPr lang="en-US" dirty="0"/>
+              <a:t>AND (&amp;&amp;)</a:t>
+            </a:r>
+          </a:p>
+          <a:p>
+            <a:pPr marL="342900" indent="-342900">
+              <a:buAutoNum type="alphaUcPeriod"/>
+            </a:pPr>
+            <a:r>
+              <a:rPr lang="en-US" dirty="0"/>
+              <a:t>OR (||)</a:t>
+            </a:r>
+          </a:p>
+          <a:p>
+            <a:pPr marL="342900" indent="-342900">
+              <a:buAutoNum type="alphaUcPeriod"/>
+            </a:pPr>
+            <a:r>
+              <a:rPr lang="en-US" dirty="0"/>
+              <a:t>NOT (!)</a:t>
+            </a:r>
+          </a:p>
+        </p:txBody>
+      </p:sp>
+      <p:pic>
+        <p:nvPicPr>
+          <p:cNvPr id="4" name="Picture 3">
+            <a:extLst>
+              <a:ext uri="{FF2B5EF4-FFF2-40B4-BE49-F238E27FC236}">
+                <a16:creationId xmlns:a16="http://schemas.microsoft.com/office/drawing/2014/main" id="{417B400A-D2D4-430A-AC34-82DA7951B365}"/>
+              </a:ext>
+            </a:extLst>
+          </p:cNvPr>
+          <p:cNvPicPr>
+            <a:picLocks noChangeAspect="1"/>
+          </p:cNvPicPr>
+          <p:nvPr/>
+        </p:nvPicPr>
+        <p:blipFill>
+          <a:blip r:embed="rId2"/>
+          <a:stretch>
+            <a:fillRect/>
+          </a:stretch>
+        </p:blipFill>
+        <p:spPr>
+          <a:xfrm>
+            <a:off x="1135209" y="2412930"/>
+            <a:ext cx="3381375" cy="1933575"/>
+          </a:xfrm>
+          <a:prstGeom prst="rect">
+            <a:avLst/>
+          </a:prstGeom>
+        </p:spPr>
+      </p:pic>
+      <mc:AlternateContent xmlns:mc="http://schemas.openxmlformats.org/markup-compatibility/2006" xmlns:p14="http://schemas.microsoft.com/office/powerpoint/2010/main">
+        <mc:Choice Requires="p14">
+          <p:contentPart p14:bwMode="auto" r:id="rId3">
+            <p14:nvContentPartPr>
+              <p14:cNvPr id="8" name="Ink 7">
+                <a:extLst>
+                  <a:ext uri="{FF2B5EF4-FFF2-40B4-BE49-F238E27FC236}">
+                    <a16:creationId xmlns:a16="http://schemas.microsoft.com/office/drawing/2014/main" id="{DA9F3E6B-39A5-4581-940B-C91546280994}"/>
+                  </a:ext>
+                </a:extLst>
+              </p14:cNvPr>
+              <p14:cNvContentPartPr/>
+              <p14:nvPr/>
+            </p14:nvContentPartPr>
+            <p14:xfrm>
+              <a:off x="3394989" y="2579337"/>
+              <a:ext cx="199440" cy="124200"/>
+            </p14:xfrm>
+          </p:contentPart>
+        </mc:Choice>
+        <mc:Fallback xmlns="">
+          <p:pic>
+            <p:nvPicPr>
+              <p:cNvPr id="8" name="Ink 7">
+                <a:extLst>
+                  <a:ext uri="{FF2B5EF4-FFF2-40B4-BE49-F238E27FC236}">
+                    <a16:creationId xmlns:a16="http://schemas.microsoft.com/office/drawing/2014/main" id="{DA9F3E6B-39A5-4581-940B-C91546280994}"/>
+                  </a:ext>
+                </a:extLst>
+              </p:cNvPr>
+              <p:cNvPicPr/>
+              <p:nvPr/>
+            </p:nvPicPr>
+            <p:blipFill>
+              <a:blip r:embed="rId4"/>
+              <a:stretch>
+                <a:fillRect/>
+              </a:stretch>
+            </p:blipFill>
+            <p:spPr>
+              <a:xfrm>
+                <a:off x="3340989" y="2471697"/>
+                <a:ext cx="307080" cy="339840"/>
+              </a:xfrm>
+              <a:prstGeom prst="rect">
+                <a:avLst/>
+              </a:prstGeom>
+            </p:spPr>
+          </p:pic>
+        </mc:Fallback>
+      </mc:AlternateContent>
+      <mc:AlternateContent xmlns:mc="http://schemas.openxmlformats.org/markup-compatibility/2006" xmlns:p14="http://schemas.microsoft.com/office/powerpoint/2010/main">
+        <mc:Choice Requires="p14">
+          <p:contentPart p14:bwMode="auto" r:id="rId5">
+            <p14:nvContentPartPr>
+              <p14:cNvPr id="12" name="Ink 11">
+                <a:extLst>
+                  <a:ext uri="{FF2B5EF4-FFF2-40B4-BE49-F238E27FC236}">
+                    <a16:creationId xmlns:a16="http://schemas.microsoft.com/office/drawing/2014/main" id="{C9EAD53D-80EC-4C60-9E38-F442A4A1B33C}"/>
+                  </a:ext>
+                </a:extLst>
+              </p14:cNvPr>
+              <p14:cNvContentPartPr/>
+              <p14:nvPr/>
+            </p14:nvContentPartPr>
+            <p14:xfrm>
+              <a:off x="3759309" y="4844097"/>
+              <a:ext cx="140760" cy="194760"/>
+            </p14:xfrm>
+          </p:contentPart>
+        </mc:Choice>
+        <mc:Fallback xmlns="">
+          <p:pic>
+            <p:nvPicPr>
+              <p:cNvPr id="12" name="Ink 11">
+                <a:extLst>
+                  <a:ext uri="{FF2B5EF4-FFF2-40B4-BE49-F238E27FC236}">
+                    <a16:creationId xmlns:a16="http://schemas.microsoft.com/office/drawing/2014/main" id="{C9EAD53D-80EC-4C60-9E38-F442A4A1B33C}"/>
+                  </a:ext>
+                </a:extLst>
+              </p:cNvPr>
+              <p:cNvPicPr/>
+              <p:nvPr/>
+            </p:nvPicPr>
+            <p:blipFill>
+              <a:blip r:embed="rId6"/>
+              <a:stretch>
+                <a:fillRect/>
+              </a:stretch>
+            </p:blipFill>
+            <p:spPr>
+              <a:xfrm>
+                <a:off x="3705669" y="4736097"/>
+                <a:ext cx="248400" cy="410400"/>
+              </a:xfrm>
+              <a:prstGeom prst="rect">
+                <a:avLst/>
+              </a:prstGeom>
+            </p:spPr>
+          </p:pic>
+        </mc:Fallback>
+      </mc:AlternateContent>
+    </p:spTree>
+    <p:extLst>
+      <p:ext uri="{BB962C8B-B14F-4D97-AF65-F5344CB8AC3E}">
+        <p14:creationId xmlns:p14="http://schemas.microsoft.com/office/powerpoint/2010/main" val="3399856286"/>
       </p:ext>
     </p:extLst>
   </p:cSld>
@@ -10237,14 +10307,14 @@
             <a:pPr lvl="3"/>
             <a:r>
               <a:rPr lang="en-US" dirty="0"/>
-              <a:t>Returns – QBFJ</a:t>
+              <a:t>Returns – QBFJU</a:t>
             </a:r>
           </a:p>
           <a:p>
             <a:pPr lvl="2"/>
             <a:r>
               <a:rPr lang="en-US" dirty="0"/>
-              <a:t>Hint – I would always build the second strength, whether you return it or not – the if condition is probably *after* the loop.</a:t>
+              <a:t>Hint – I would always build the second String, whether you return it or not – the if condition is probably *after* the loop using .length() on both Strings.</a:t>
             </a:r>
           </a:p>
           <a:p>

</xml_diff>

<commit_message>
updated with interactive slides
</commit_message>
<xml_diff>
--- a/slides/On-Campus/06_01_LogicalOperators.pptx
+++ b/slides/On-Campus/06_01_LogicalOperators.pptx
@@ -222,7 +222,7 @@
           <a:p>
             <a:fld id="{4D7E51A5-B478-1E40-8CBB-0DAA8831E99D}" type="datetimeFigureOut">
               <a:rPr lang="en-US" smtClean="0"/>
-              <a:t>9/27/21</a:t>
+              <a:t>2/12/2022</a:t>
             </a:fld>
             <a:endParaRPr lang="en-US"/>
           </a:p>
@@ -447,7 +447,7 @@
           <a:p>
             <a:fld id="{D0ED587F-861E-6740-9643-E3DDAE89B8D6}" type="datetimeFigureOut">
               <a:rPr lang="en-US" smtClean="0"/>
-              <a:t>9/27/21</a:t>
+              <a:t>2/12/2022</a:t>
             </a:fld>
             <a:endParaRPr lang="en-US"/>
           </a:p>

</xml_diff>